<commit_message>
Added a slide and corrected spelling problem
</commit_message>
<xml_diff>
--- a/Day 2 - Digital Logic and Operations/Digital Logic and Operations.pptx
+++ b/Day 2 - Digital Logic and Operations/Digital Logic and Operations.pptx
@@ -162,7 +162,7 @@
           <p:cNvPr id="2" name="Title 1">
             <a:extLst>
               <a:ext uri="{FF2B5EF4-FFF2-40B4-BE49-F238E27FC236}">
-                <a16:creationId xmlns="" xmlns:a16="http://schemas.microsoft.com/office/drawing/2014/main" id="{81555A63-69C3-4FA6-A41A-09FD3CCC39A7}"/>
+                <a16:creationId xmlns:a16="http://schemas.microsoft.com/office/drawing/2014/main" xmlns="" id="{81555A63-69C3-4FA6-A41A-09FD3CCC39A7}"/>
               </a:ext>
             </a:extLst>
           </p:cNvPr>
@@ -199,7 +199,7 @@
           <p:cNvPr id="3" name="Subtitle 2">
             <a:extLst>
               <a:ext uri="{FF2B5EF4-FFF2-40B4-BE49-F238E27FC236}">
-                <a16:creationId xmlns="" xmlns:a16="http://schemas.microsoft.com/office/drawing/2014/main" id="{21D123A1-5C77-48BA-B277-138A233A1205}"/>
+                <a16:creationId xmlns:a16="http://schemas.microsoft.com/office/drawing/2014/main" xmlns="" id="{21D123A1-5C77-48BA-B277-138A233A1205}"/>
               </a:ext>
             </a:extLst>
           </p:cNvPr>
@@ -269,7 +269,7 @@
           <p:cNvPr id="4" name="Date Placeholder 3">
             <a:extLst>
               <a:ext uri="{FF2B5EF4-FFF2-40B4-BE49-F238E27FC236}">
-                <a16:creationId xmlns="" xmlns:a16="http://schemas.microsoft.com/office/drawing/2014/main" id="{C1C57C32-0E06-4921-A144-3421B96FEE36}"/>
+                <a16:creationId xmlns:a16="http://schemas.microsoft.com/office/drawing/2014/main" xmlns="" id="{C1C57C32-0E06-4921-A144-3421B96FEE36}"/>
               </a:ext>
             </a:extLst>
           </p:cNvPr>
@@ -287,7 +287,7 @@
           <a:p>
             <a:fld id="{96F8FDAF-70E1-4658-93D8-51FF92779D9A}" type="datetimeFigureOut">
               <a:rPr lang="en-US" smtClean="0"/>
-              <a:t>4/10/2018</a:t>
+              <a:t>4/12/2018</a:t>
             </a:fld>
             <a:endParaRPr lang="en-US"/>
           </a:p>
@@ -298,7 +298,7 @@
           <p:cNvPr id="5" name="Footer Placeholder 4">
             <a:extLst>
               <a:ext uri="{FF2B5EF4-FFF2-40B4-BE49-F238E27FC236}">
-                <a16:creationId xmlns="" xmlns:a16="http://schemas.microsoft.com/office/drawing/2014/main" id="{38B17E26-3C3A-438B-A350-5E7557221D9D}"/>
+                <a16:creationId xmlns:a16="http://schemas.microsoft.com/office/drawing/2014/main" xmlns="" id="{38B17E26-3C3A-438B-A350-5E7557221D9D}"/>
               </a:ext>
             </a:extLst>
           </p:cNvPr>
@@ -323,7 +323,7 @@
           <p:cNvPr id="6" name="Slide Number Placeholder 5">
             <a:extLst>
               <a:ext uri="{FF2B5EF4-FFF2-40B4-BE49-F238E27FC236}">
-                <a16:creationId xmlns="" xmlns:a16="http://schemas.microsoft.com/office/drawing/2014/main" id="{351C08BF-8F47-49F1-8BBC-C85B3FAA5312}"/>
+                <a16:creationId xmlns:a16="http://schemas.microsoft.com/office/drawing/2014/main" xmlns="" id="{351C08BF-8F47-49F1-8BBC-C85B3FAA5312}"/>
               </a:ext>
             </a:extLst>
           </p:cNvPr>
@@ -382,7 +382,7 @@
           <p:cNvPr id="2" name="Title 1">
             <a:extLst>
               <a:ext uri="{FF2B5EF4-FFF2-40B4-BE49-F238E27FC236}">
-                <a16:creationId xmlns="" xmlns:a16="http://schemas.microsoft.com/office/drawing/2014/main" id="{E45D3F37-C919-412F-A452-1264CC784AE0}"/>
+                <a16:creationId xmlns:a16="http://schemas.microsoft.com/office/drawing/2014/main" xmlns="" id="{E45D3F37-C919-412F-A452-1264CC784AE0}"/>
               </a:ext>
             </a:extLst>
           </p:cNvPr>
@@ -410,7 +410,7 @@
           <p:cNvPr id="3" name="Vertical Text Placeholder 2">
             <a:extLst>
               <a:ext uri="{FF2B5EF4-FFF2-40B4-BE49-F238E27FC236}">
-                <a16:creationId xmlns="" xmlns:a16="http://schemas.microsoft.com/office/drawing/2014/main" id="{1F532BA8-C2B4-4B5D-BE71-E95D4ECBC758}"/>
+                <a16:creationId xmlns:a16="http://schemas.microsoft.com/office/drawing/2014/main" xmlns="" id="{1F532BA8-C2B4-4B5D-BE71-E95D4ECBC758}"/>
               </a:ext>
             </a:extLst>
           </p:cNvPr>
@@ -467,7 +467,7 @@
           <p:cNvPr id="4" name="Date Placeholder 3">
             <a:extLst>
               <a:ext uri="{FF2B5EF4-FFF2-40B4-BE49-F238E27FC236}">
-                <a16:creationId xmlns="" xmlns:a16="http://schemas.microsoft.com/office/drawing/2014/main" id="{410F2166-4F9B-443C-B1CC-B079BF11BD5D}"/>
+                <a16:creationId xmlns:a16="http://schemas.microsoft.com/office/drawing/2014/main" xmlns="" id="{410F2166-4F9B-443C-B1CC-B079BF11BD5D}"/>
               </a:ext>
             </a:extLst>
           </p:cNvPr>
@@ -485,7 +485,7 @@
           <a:p>
             <a:fld id="{96F8FDAF-70E1-4658-93D8-51FF92779D9A}" type="datetimeFigureOut">
               <a:rPr lang="en-US" smtClean="0"/>
-              <a:t>4/10/2018</a:t>
+              <a:t>4/12/2018</a:t>
             </a:fld>
             <a:endParaRPr lang="en-US"/>
           </a:p>
@@ -496,7 +496,7 @@
           <p:cNvPr id="5" name="Footer Placeholder 4">
             <a:extLst>
               <a:ext uri="{FF2B5EF4-FFF2-40B4-BE49-F238E27FC236}">
-                <a16:creationId xmlns="" xmlns:a16="http://schemas.microsoft.com/office/drawing/2014/main" id="{2F620AB0-AF21-49E1-8302-1ADF5FA30A0A}"/>
+                <a16:creationId xmlns:a16="http://schemas.microsoft.com/office/drawing/2014/main" xmlns="" id="{2F620AB0-AF21-49E1-8302-1ADF5FA30A0A}"/>
               </a:ext>
             </a:extLst>
           </p:cNvPr>
@@ -521,7 +521,7 @@
           <p:cNvPr id="6" name="Slide Number Placeholder 5">
             <a:extLst>
               <a:ext uri="{FF2B5EF4-FFF2-40B4-BE49-F238E27FC236}">
-                <a16:creationId xmlns="" xmlns:a16="http://schemas.microsoft.com/office/drawing/2014/main" id="{36121CB4-96D4-4F2D-B6AA-3532528CD3A2}"/>
+                <a16:creationId xmlns:a16="http://schemas.microsoft.com/office/drawing/2014/main" xmlns="" id="{36121CB4-96D4-4F2D-B6AA-3532528CD3A2}"/>
               </a:ext>
             </a:extLst>
           </p:cNvPr>
@@ -580,7 +580,7 @@
           <p:cNvPr id="2" name="Vertical Title 1">
             <a:extLst>
               <a:ext uri="{FF2B5EF4-FFF2-40B4-BE49-F238E27FC236}">
-                <a16:creationId xmlns="" xmlns:a16="http://schemas.microsoft.com/office/drawing/2014/main" id="{B583F993-BB6E-4DBE-B50B-B34D094F5950}"/>
+                <a16:creationId xmlns:a16="http://schemas.microsoft.com/office/drawing/2014/main" xmlns="" id="{B583F993-BB6E-4DBE-B50B-B34D094F5950}"/>
               </a:ext>
             </a:extLst>
           </p:cNvPr>
@@ -613,7 +613,7 @@
           <p:cNvPr id="3" name="Vertical Text Placeholder 2">
             <a:extLst>
               <a:ext uri="{FF2B5EF4-FFF2-40B4-BE49-F238E27FC236}">
-                <a16:creationId xmlns="" xmlns:a16="http://schemas.microsoft.com/office/drawing/2014/main" id="{F4F70B15-CBD7-4528-8604-EE12B29276EB}"/>
+                <a16:creationId xmlns:a16="http://schemas.microsoft.com/office/drawing/2014/main" xmlns="" id="{F4F70B15-CBD7-4528-8604-EE12B29276EB}"/>
               </a:ext>
             </a:extLst>
           </p:cNvPr>
@@ -675,7 +675,7 @@
           <p:cNvPr id="4" name="Date Placeholder 3">
             <a:extLst>
               <a:ext uri="{FF2B5EF4-FFF2-40B4-BE49-F238E27FC236}">
-                <a16:creationId xmlns="" xmlns:a16="http://schemas.microsoft.com/office/drawing/2014/main" id="{191452D5-B422-4063-AA4F-A99E7A778BA0}"/>
+                <a16:creationId xmlns:a16="http://schemas.microsoft.com/office/drawing/2014/main" xmlns="" id="{191452D5-B422-4063-AA4F-A99E7A778BA0}"/>
               </a:ext>
             </a:extLst>
           </p:cNvPr>
@@ -693,7 +693,7 @@
           <a:p>
             <a:fld id="{96F8FDAF-70E1-4658-93D8-51FF92779D9A}" type="datetimeFigureOut">
               <a:rPr lang="en-US" smtClean="0"/>
-              <a:t>4/10/2018</a:t>
+              <a:t>4/12/2018</a:t>
             </a:fld>
             <a:endParaRPr lang="en-US"/>
           </a:p>
@@ -704,7 +704,7 @@
           <p:cNvPr id="5" name="Footer Placeholder 4">
             <a:extLst>
               <a:ext uri="{FF2B5EF4-FFF2-40B4-BE49-F238E27FC236}">
-                <a16:creationId xmlns="" xmlns:a16="http://schemas.microsoft.com/office/drawing/2014/main" id="{25907ABC-5414-4E73-9821-A8A98C1F22A3}"/>
+                <a16:creationId xmlns:a16="http://schemas.microsoft.com/office/drawing/2014/main" xmlns="" id="{25907ABC-5414-4E73-9821-A8A98C1F22A3}"/>
               </a:ext>
             </a:extLst>
           </p:cNvPr>
@@ -729,7 +729,7 @@
           <p:cNvPr id="6" name="Slide Number Placeholder 5">
             <a:extLst>
               <a:ext uri="{FF2B5EF4-FFF2-40B4-BE49-F238E27FC236}">
-                <a16:creationId xmlns="" xmlns:a16="http://schemas.microsoft.com/office/drawing/2014/main" id="{2890E9A0-D688-4AC7-AB26-AB842396E3CD}"/>
+                <a16:creationId xmlns:a16="http://schemas.microsoft.com/office/drawing/2014/main" xmlns="" id="{2890E9A0-D688-4AC7-AB26-AB842396E3CD}"/>
               </a:ext>
             </a:extLst>
           </p:cNvPr>
@@ -788,7 +788,7 @@
           <p:cNvPr id="2" name="Title 1">
             <a:extLst>
               <a:ext uri="{FF2B5EF4-FFF2-40B4-BE49-F238E27FC236}">
-                <a16:creationId xmlns="" xmlns:a16="http://schemas.microsoft.com/office/drawing/2014/main" id="{0B75B19F-C4B5-4EA3-96B5-38C65A568A11}"/>
+                <a16:creationId xmlns:a16="http://schemas.microsoft.com/office/drawing/2014/main" xmlns="" id="{0B75B19F-C4B5-4EA3-96B5-38C65A568A11}"/>
               </a:ext>
             </a:extLst>
           </p:cNvPr>
@@ -816,7 +816,7 @@
           <p:cNvPr id="3" name="Content Placeholder 2">
             <a:extLst>
               <a:ext uri="{FF2B5EF4-FFF2-40B4-BE49-F238E27FC236}">
-                <a16:creationId xmlns="" xmlns:a16="http://schemas.microsoft.com/office/drawing/2014/main" id="{5EF70E57-D323-4CDC-8238-19FCE1D7C673}"/>
+                <a16:creationId xmlns:a16="http://schemas.microsoft.com/office/drawing/2014/main" xmlns="" id="{5EF70E57-D323-4CDC-8238-19FCE1D7C673}"/>
               </a:ext>
             </a:extLst>
           </p:cNvPr>
@@ -873,7 +873,7 @@
           <p:cNvPr id="4" name="Date Placeholder 3">
             <a:extLst>
               <a:ext uri="{FF2B5EF4-FFF2-40B4-BE49-F238E27FC236}">
-                <a16:creationId xmlns="" xmlns:a16="http://schemas.microsoft.com/office/drawing/2014/main" id="{41325290-DD43-48F6-AF87-DC284B513242}"/>
+                <a16:creationId xmlns:a16="http://schemas.microsoft.com/office/drawing/2014/main" xmlns="" id="{41325290-DD43-48F6-AF87-DC284B513242}"/>
               </a:ext>
             </a:extLst>
           </p:cNvPr>
@@ -891,7 +891,7 @@
           <a:p>
             <a:fld id="{96F8FDAF-70E1-4658-93D8-51FF92779D9A}" type="datetimeFigureOut">
               <a:rPr lang="en-US" smtClean="0"/>
-              <a:t>4/10/2018</a:t>
+              <a:t>4/12/2018</a:t>
             </a:fld>
             <a:endParaRPr lang="en-US"/>
           </a:p>
@@ -902,7 +902,7 @@
           <p:cNvPr id="5" name="Footer Placeholder 4">
             <a:extLst>
               <a:ext uri="{FF2B5EF4-FFF2-40B4-BE49-F238E27FC236}">
-                <a16:creationId xmlns="" xmlns:a16="http://schemas.microsoft.com/office/drawing/2014/main" id="{A1851655-7684-44DB-97A2-CAD9B43B022B}"/>
+                <a16:creationId xmlns:a16="http://schemas.microsoft.com/office/drawing/2014/main" xmlns="" id="{A1851655-7684-44DB-97A2-CAD9B43B022B}"/>
               </a:ext>
             </a:extLst>
           </p:cNvPr>
@@ -927,7 +927,7 @@
           <p:cNvPr id="6" name="Slide Number Placeholder 5">
             <a:extLst>
               <a:ext uri="{FF2B5EF4-FFF2-40B4-BE49-F238E27FC236}">
-                <a16:creationId xmlns="" xmlns:a16="http://schemas.microsoft.com/office/drawing/2014/main" id="{A6B05755-01AC-406F-9384-86BFAE38269A}"/>
+                <a16:creationId xmlns:a16="http://schemas.microsoft.com/office/drawing/2014/main" xmlns="" id="{A6B05755-01AC-406F-9384-86BFAE38269A}"/>
               </a:ext>
             </a:extLst>
           </p:cNvPr>
@@ -986,7 +986,7 @@
           <p:cNvPr id="2" name="Title 1">
             <a:extLst>
               <a:ext uri="{FF2B5EF4-FFF2-40B4-BE49-F238E27FC236}">
-                <a16:creationId xmlns="" xmlns:a16="http://schemas.microsoft.com/office/drawing/2014/main" id="{419E6B2B-393B-46BD-9917-5191C6710144}"/>
+                <a16:creationId xmlns:a16="http://schemas.microsoft.com/office/drawing/2014/main" xmlns="" id="{419E6B2B-393B-46BD-9917-5191C6710144}"/>
               </a:ext>
             </a:extLst>
           </p:cNvPr>
@@ -1023,7 +1023,7 @@
           <p:cNvPr id="3" name="Text Placeholder 2">
             <a:extLst>
               <a:ext uri="{FF2B5EF4-FFF2-40B4-BE49-F238E27FC236}">
-                <a16:creationId xmlns="" xmlns:a16="http://schemas.microsoft.com/office/drawing/2014/main" id="{8EF33683-E880-4ABC-81FE-4310F283FCB8}"/>
+                <a16:creationId xmlns:a16="http://schemas.microsoft.com/office/drawing/2014/main" xmlns="" id="{8EF33683-E880-4ABC-81FE-4310F283FCB8}"/>
               </a:ext>
             </a:extLst>
           </p:cNvPr>
@@ -1148,7 +1148,7 @@
           <p:cNvPr id="4" name="Date Placeholder 3">
             <a:extLst>
               <a:ext uri="{FF2B5EF4-FFF2-40B4-BE49-F238E27FC236}">
-                <a16:creationId xmlns="" xmlns:a16="http://schemas.microsoft.com/office/drawing/2014/main" id="{B345FC5E-10AC-4F13-8F81-A1560B6C2DBD}"/>
+                <a16:creationId xmlns:a16="http://schemas.microsoft.com/office/drawing/2014/main" xmlns="" id="{B345FC5E-10AC-4F13-8F81-A1560B6C2DBD}"/>
               </a:ext>
             </a:extLst>
           </p:cNvPr>
@@ -1166,7 +1166,7 @@
           <a:p>
             <a:fld id="{96F8FDAF-70E1-4658-93D8-51FF92779D9A}" type="datetimeFigureOut">
               <a:rPr lang="en-US" smtClean="0"/>
-              <a:t>4/10/2018</a:t>
+              <a:t>4/12/2018</a:t>
             </a:fld>
             <a:endParaRPr lang="en-US"/>
           </a:p>
@@ -1177,7 +1177,7 @@
           <p:cNvPr id="5" name="Footer Placeholder 4">
             <a:extLst>
               <a:ext uri="{FF2B5EF4-FFF2-40B4-BE49-F238E27FC236}">
-                <a16:creationId xmlns="" xmlns:a16="http://schemas.microsoft.com/office/drawing/2014/main" id="{356904B2-B358-44F6-B536-25795610605D}"/>
+                <a16:creationId xmlns:a16="http://schemas.microsoft.com/office/drawing/2014/main" xmlns="" id="{356904B2-B358-44F6-B536-25795610605D}"/>
               </a:ext>
             </a:extLst>
           </p:cNvPr>
@@ -1202,7 +1202,7 @@
           <p:cNvPr id="6" name="Slide Number Placeholder 5">
             <a:extLst>
               <a:ext uri="{FF2B5EF4-FFF2-40B4-BE49-F238E27FC236}">
-                <a16:creationId xmlns="" xmlns:a16="http://schemas.microsoft.com/office/drawing/2014/main" id="{E21589FF-8E71-4AD6-AC0F-75196CD138AD}"/>
+                <a16:creationId xmlns:a16="http://schemas.microsoft.com/office/drawing/2014/main" xmlns="" id="{E21589FF-8E71-4AD6-AC0F-75196CD138AD}"/>
               </a:ext>
             </a:extLst>
           </p:cNvPr>
@@ -1261,7 +1261,7 @@
           <p:cNvPr id="2" name="Title 1">
             <a:extLst>
               <a:ext uri="{FF2B5EF4-FFF2-40B4-BE49-F238E27FC236}">
-                <a16:creationId xmlns="" xmlns:a16="http://schemas.microsoft.com/office/drawing/2014/main" id="{F29FA62F-7565-4FD1-9A02-566B7A5C58EE}"/>
+                <a16:creationId xmlns:a16="http://schemas.microsoft.com/office/drawing/2014/main" xmlns="" id="{F29FA62F-7565-4FD1-9A02-566B7A5C58EE}"/>
               </a:ext>
             </a:extLst>
           </p:cNvPr>
@@ -1289,7 +1289,7 @@
           <p:cNvPr id="3" name="Content Placeholder 2">
             <a:extLst>
               <a:ext uri="{FF2B5EF4-FFF2-40B4-BE49-F238E27FC236}">
-                <a16:creationId xmlns="" xmlns:a16="http://schemas.microsoft.com/office/drawing/2014/main" id="{ECE108B3-6356-4C1E-9A75-5C7093E384E1}"/>
+                <a16:creationId xmlns:a16="http://schemas.microsoft.com/office/drawing/2014/main" xmlns="" id="{ECE108B3-6356-4C1E-9A75-5C7093E384E1}"/>
               </a:ext>
             </a:extLst>
           </p:cNvPr>
@@ -1351,7 +1351,7 @@
           <p:cNvPr id="4" name="Content Placeholder 3">
             <a:extLst>
               <a:ext uri="{FF2B5EF4-FFF2-40B4-BE49-F238E27FC236}">
-                <a16:creationId xmlns="" xmlns:a16="http://schemas.microsoft.com/office/drawing/2014/main" id="{B8B47841-F4D1-4653-A10D-7FE8FA116A8E}"/>
+                <a16:creationId xmlns:a16="http://schemas.microsoft.com/office/drawing/2014/main" xmlns="" id="{B8B47841-F4D1-4653-A10D-7FE8FA116A8E}"/>
               </a:ext>
             </a:extLst>
           </p:cNvPr>
@@ -1413,7 +1413,7 @@
           <p:cNvPr id="5" name="Date Placeholder 4">
             <a:extLst>
               <a:ext uri="{FF2B5EF4-FFF2-40B4-BE49-F238E27FC236}">
-                <a16:creationId xmlns="" xmlns:a16="http://schemas.microsoft.com/office/drawing/2014/main" id="{0B5E1BD5-72F9-40C5-B032-B20565ECC425}"/>
+                <a16:creationId xmlns:a16="http://schemas.microsoft.com/office/drawing/2014/main" xmlns="" id="{0B5E1BD5-72F9-40C5-B032-B20565ECC425}"/>
               </a:ext>
             </a:extLst>
           </p:cNvPr>
@@ -1431,7 +1431,7 @@
           <a:p>
             <a:fld id="{96F8FDAF-70E1-4658-93D8-51FF92779D9A}" type="datetimeFigureOut">
               <a:rPr lang="en-US" smtClean="0"/>
-              <a:t>4/10/2018</a:t>
+              <a:t>4/12/2018</a:t>
             </a:fld>
             <a:endParaRPr lang="en-US"/>
           </a:p>
@@ -1442,7 +1442,7 @@
           <p:cNvPr id="6" name="Footer Placeholder 5">
             <a:extLst>
               <a:ext uri="{FF2B5EF4-FFF2-40B4-BE49-F238E27FC236}">
-                <a16:creationId xmlns="" xmlns:a16="http://schemas.microsoft.com/office/drawing/2014/main" id="{105736AD-1405-4DD4-8485-7C0B2FAA377A}"/>
+                <a16:creationId xmlns:a16="http://schemas.microsoft.com/office/drawing/2014/main" xmlns="" id="{105736AD-1405-4DD4-8485-7C0B2FAA377A}"/>
               </a:ext>
             </a:extLst>
           </p:cNvPr>
@@ -1467,7 +1467,7 @@
           <p:cNvPr id="7" name="Slide Number Placeholder 6">
             <a:extLst>
               <a:ext uri="{FF2B5EF4-FFF2-40B4-BE49-F238E27FC236}">
-                <a16:creationId xmlns="" xmlns:a16="http://schemas.microsoft.com/office/drawing/2014/main" id="{BF957EB7-DBFC-4F59-961A-92482EBB4424}"/>
+                <a16:creationId xmlns:a16="http://schemas.microsoft.com/office/drawing/2014/main" xmlns="" id="{BF957EB7-DBFC-4F59-961A-92482EBB4424}"/>
               </a:ext>
             </a:extLst>
           </p:cNvPr>
@@ -1526,7 +1526,7 @@
           <p:cNvPr id="2" name="Title 1">
             <a:extLst>
               <a:ext uri="{FF2B5EF4-FFF2-40B4-BE49-F238E27FC236}">
-                <a16:creationId xmlns="" xmlns:a16="http://schemas.microsoft.com/office/drawing/2014/main" id="{B8FDF365-9746-4BE8-B97D-6D8401231049}"/>
+                <a16:creationId xmlns:a16="http://schemas.microsoft.com/office/drawing/2014/main" xmlns="" id="{B8FDF365-9746-4BE8-B97D-6D8401231049}"/>
               </a:ext>
             </a:extLst>
           </p:cNvPr>
@@ -1559,7 +1559,7 @@
           <p:cNvPr id="3" name="Text Placeholder 2">
             <a:extLst>
               <a:ext uri="{FF2B5EF4-FFF2-40B4-BE49-F238E27FC236}">
-                <a16:creationId xmlns="" xmlns:a16="http://schemas.microsoft.com/office/drawing/2014/main" id="{554FEDA4-7274-4B00-9C77-AB7838B4CA95}"/>
+                <a16:creationId xmlns:a16="http://schemas.microsoft.com/office/drawing/2014/main" xmlns="" id="{554FEDA4-7274-4B00-9C77-AB7838B4CA95}"/>
               </a:ext>
             </a:extLst>
           </p:cNvPr>
@@ -1630,7 +1630,7 @@
           <p:cNvPr id="4" name="Content Placeholder 3">
             <a:extLst>
               <a:ext uri="{FF2B5EF4-FFF2-40B4-BE49-F238E27FC236}">
-                <a16:creationId xmlns="" xmlns:a16="http://schemas.microsoft.com/office/drawing/2014/main" id="{8E759D05-E5B1-435F-B565-2825656CC145}"/>
+                <a16:creationId xmlns:a16="http://schemas.microsoft.com/office/drawing/2014/main" xmlns="" id="{8E759D05-E5B1-435F-B565-2825656CC145}"/>
               </a:ext>
             </a:extLst>
           </p:cNvPr>
@@ -1692,7 +1692,7 @@
           <p:cNvPr id="5" name="Text Placeholder 4">
             <a:extLst>
               <a:ext uri="{FF2B5EF4-FFF2-40B4-BE49-F238E27FC236}">
-                <a16:creationId xmlns="" xmlns:a16="http://schemas.microsoft.com/office/drawing/2014/main" id="{11768715-484D-44EF-ABCC-161FC65237B5}"/>
+                <a16:creationId xmlns:a16="http://schemas.microsoft.com/office/drawing/2014/main" xmlns="" id="{11768715-484D-44EF-ABCC-161FC65237B5}"/>
               </a:ext>
             </a:extLst>
           </p:cNvPr>
@@ -1763,7 +1763,7 @@
           <p:cNvPr id="6" name="Content Placeholder 5">
             <a:extLst>
               <a:ext uri="{FF2B5EF4-FFF2-40B4-BE49-F238E27FC236}">
-                <a16:creationId xmlns="" xmlns:a16="http://schemas.microsoft.com/office/drawing/2014/main" id="{D7DE7B3B-520B-4C0F-8B6D-E6354FC4FA2F}"/>
+                <a16:creationId xmlns:a16="http://schemas.microsoft.com/office/drawing/2014/main" xmlns="" id="{D7DE7B3B-520B-4C0F-8B6D-E6354FC4FA2F}"/>
               </a:ext>
             </a:extLst>
           </p:cNvPr>
@@ -1825,7 +1825,7 @@
           <p:cNvPr id="7" name="Date Placeholder 6">
             <a:extLst>
               <a:ext uri="{FF2B5EF4-FFF2-40B4-BE49-F238E27FC236}">
-                <a16:creationId xmlns="" xmlns:a16="http://schemas.microsoft.com/office/drawing/2014/main" id="{21A544CA-964D-46CC-86E5-F684EE105400}"/>
+                <a16:creationId xmlns:a16="http://schemas.microsoft.com/office/drawing/2014/main" xmlns="" id="{21A544CA-964D-46CC-86E5-F684EE105400}"/>
               </a:ext>
             </a:extLst>
           </p:cNvPr>
@@ -1843,7 +1843,7 @@
           <a:p>
             <a:fld id="{96F8FDAF-70E1-4658-93D8-51FF92779D9A}" type="datetimeFigureOut">
               <a:rPr lang="en-US" smtClean="0"/>
-              <a:t>4/10/2018</a:t>
+              <a:t>4/12/2018</a:t>
             </a:fld>
             <a:endParaRPr lang="en-US"/>
           </a:p>
@@ -1854,7 +1854,7 @@
           <p:cNvPr id="8" name="Footer Placeholder 7">
             <a:extLst>
               <a:ext uri="{FF2B5EF4-FFF2-40B4-BE49-F238E27FC236}">
-                <a16:creationId xmlns="" xmlns:a16="http://schemas.microsoft.com/office/drawing/2014/main" id="{99045DAA-2FB8-48C7-9C58-33774B3C707D}"/>
+                <a16:creationId xmlns:a16="http://schemas.microsoft.com/office/drawing/2014/main" xmlns="" id="{99045DAA-2FB8-48C7-9C58-33774B3C707D}"/>
               </a:ext>
             </a:extLst>
           </p:cNvPr>
@@ -1879,7 +1879,7 @@
           <p:cNvPr id="9" name="Slide Number Placeholder 8">
             <a:extLst>
               <a:ext uri="{FF2B5EF4-FFF2-40B4-BE49-F238E27FC236}">
-                <a16:creationId xmlns="" xmlns:a16="http://schemas.microsoft.com/office/drawing/2014/main" id="{7F9A62C1-B25D-445A-A34D-F06693242693}"/>
+                <a16:creationId xmlns:a16="http://schemas.microsoft.com/office/drawing/2014/main" xmlns="" id="{7F9A62C1-B25D-445A-A34D-F06693242693}"/>
               </a:ext>
             </a:extLst>
           </p:cNvPr>
@@ -1938,7 +1938,7 @@
           <p:cNvPr id="2" name="Title 1">
             <a:extLst>
               <a:ext uri="{FF2B5EF4-FFF2-40B4-BE49-F238E27FC236}">
-                <a16:creationId xmlns="" xmlns:a16="http://schemas.microsoft.com/office/drawing/2014/main" id="{8C937246-2F1B-4CA5-8339-83FF80CC6F65}"/>
+                <a16:creationId xmlns:a16="http://schemas.microsoft.com/office/drawing/2014/main" xmlns="" id="{8C937246-2F1B-4CA5-8339-83FF80CC6F65}"/>
               </a:ext>
             </a:extLst>
           </p:cNvPr>
@@ -1966,7 +1966,7 @@
           <p:cNvPr id="3" name="Date Placeholder 2">
             <a:extLst>
               <a:ext uri="{FF2B5EF4-FFF2-40B4-BE49-F238E27FC236}">
-                <a16:creationId xmlns="" xmlns:a16="http://schemas.microsoft.com/office/drawing/2014/main" id="{AA1127E0-1261-4BDD-9136-8C74CA015746}"/>
+                <a16:creationId xmlns:a16="http://schemas.microsoft.com/office/drawing/2014/main" xmlns="" id="{AA1127E0-1261-4BDD-9136-8C74CA015746}"/>
               </a:ext>
             </a:extLst>
           </p:cNvPr>
@@ -1984,7 +1984,7 @@
           <a:p>
             <a:fld id="{96F8FDAF-70E1-4658-93D8-51FF92779D9A}" type="datetimeFigureOut">
               <a:rPr lang="en-US" smtClean="0"/>
-              <a:t>4/10/2018</a:t>
+              <a:t>4/12/2018</a:t>
             </a:fld>
             <a:endParaRPr lang="en-US"/>
           </a:p>
@@ -1995,7 +1995,7 @@
           <p:cNvPr id="4" name="Footer Placeholder 3">
             <a:extLst>
               <a:ext uri="{FF2B5EF4-FFF2-40B4-BE49-F238E27FC236}">
-                <a16:creationId xmlns="" xmlns:a16="http://schemas.microsoft.com/office/drawing/2014/main" id="{81953EE3-7AC0-4B90-AF21-28C51ACFC7D4}"/>
+                <a16:creationId xmlns:a16="http://schemas.microsoft.com/office/drawing/2014/main" xmlns="" id="{81953EE3-7AC0-4B90-AF21-28C51ACFC7D4}"/>
               </a:ext>
             </a:extLst>
           </p:cNvPr>
@@ -2020,7 +2020,7 @@
           <p:cNvPr id="5" name="Slide Number Placeholder 4">
             <a:extLst>
               <a:ext uri="{FF2B5EF4-FFF2-40B4-BE49-F238E27FC236}">
-                <a16:creationId xmlns="" xmlns:a16="http://schemas.microsoft.com/office/drawing/2014/main" id="{9FE58A81-F76F-4B35-AB3F-DB6F8BDD197E}"/>
+                <a16:creationId xmlns:a16="http://schemas.microsoft.com/office/drawing/2014/main" xmlns="" id="{9FE58A81-F76F-4B35-AB3F-DB6F8BDD197E}"/>
               </a:ext>
             </a:extLst>
           </p:cNvPr>
@@ -2079,7 +2079,7 @@
           <p:cNvPr id="2" name="Date Placeholder 1">
             <a:extLst>
               <a:ext uri="{FF2B5EF4-FFF2-40B4-BE49-F238E27FC236}">
-                <a16:creationId xmlns="" xmlns:a16="http://schemas.microsoft.com/office/drawing/2014/main" id="{F7C55795-1AA3-4CBE-960A-CA6C2FEBE942}"/>
+                <a16:creationId xmlns:a16="http://schemas.microsoft.com/office/drawing/2014/main" xmlns="" id="{F7C55795-1AA3-4CBE-960A-CA6C2FEBE942}"/>
               </a:ext>
             </a:extLst>
           </p:cNvPr>
@@ -2097,7 +2097,7 @@
           <a:p>
             <a:fld id="{96F8FDAF-70E1-4658-93D8-51FF92779D9A}" type="datetimeFigureOut">
               <a:rPr lang="en-US" smtClean="0"/>
-              <a:t>4/10/2018</a:t>
+              <a:t>4/12/2018</a:t>
             </a:fld>
             <a:endParaRPr lang="en-US"/>
           </a:p>
@@ -2108,7 +2108,7 @@
           <p:cNvPr id="3" name="Footer Placeholder 2">
             <a:extLst>
               <a:ext uri="{FF2B5EF4-FFF2-40B4-BE49-F238E27FC236}">
-                <a16:creationId xmlns="" xmlns:a16="http://schemas.microsoft.com/office/drawing/2014/main" id="{7235FA61-BD05-47C2-AA63-5C18C9AF2A7F}"/>
+                <a16:creationId xmlns:a16="http://schemas.microsoft.com/office/drawing/2014/main" xmlns="" id="{7235FA61-BD05-47C2-AA63-5C18C9AF2A7F}"/>
               </a:ext>
             </a:extLst>
           </p:cNvPr>
@@ -2133,7 +2133,7 @@
           <p:cNvPr id="4" name="Slide Number Placeholder 3">
             <a:extLst>
               <a:ext uri="{FF2B5EF4-FFF2-40B4-BE49-F238E27FC236}">
-                <a16:creationId xmlns="" xmlns:a16="http://schemas.microsoft.com/office/drawing/2014/main" id="{4E7E0DA1-9BD2-4904-817B-F3C413982411}"/>
+                <a16:creationId xmlns:a16="http://schemas.microsoft.com/office/drawing/2014/main" xmlns="" id="{4E7E0DA1-9BD2-4904-817B-F3C413982411}"/>
               </a:ext>
             </a:extLst>
           </p:cNvPr>
@@ -2192,7 +2192,7 @@
           <p:cNvPr id="2" name="Title 1">
             <a:extLst>
               <a:ext uri="{FF2B5EF4-FFF2-40B4-BE49-F238E27FC236}">
-                <a16:creationId xmlns="" xmlns:a16="http://schemas.microsoft.com/office/drawing/2014/main" id="{DE06548A-07DA-4B39-854B-ABCA8A776BCD}"/>
+                <a16:creationId xmlns:a16="http://schemas.microsoft.com/office/drawing/2014/main" xmlns="" id="{DE06548A-07DA-4B39-854B-ABCA8A776BCD}"/>
               </a:ext>
             </a:extLst>
           </p:cNvPr>
@@ -2229,7 +2229,7 @@
           <p:cNvPr id="3" name="Content Placeholder 2">
             <a:extLst>
               <a:ext uri="{FF2B5EF4-FFF2-40B4-BE49-F238E27FC236}">
-                <a16:creationId xmlns="" xmlns:a16="http://schemas.microsoft.com/office/drawing/2014/main" id="{8AD91F98-486C-4397-9B3E-FA66C71E41B9}"/>
+                <a16:creationId xmlns:a16="http://schemas.microsoft.com/office/drawing/2014/main" xmlns="" id="{8AD91F98-486C-4397-9B3E-FA66C71E41B9}"/>
               </a:ext>
             </a:extLst>
           </p:cNvPr>
@@ -2319,7 +2319,7 @@
           <p:cNvPr id="4" name="Text Placeholder 3">
             <a:extLst>
               <a:ext uri="{FF2B5EF4-FFF2-40B4-BE49-F238E27FC236}">
-                <a16:creationId xmlns="" xmlns:a16="http://schemas.microsoft.com/office/drawing/2014/main" id="{7729D843-C50E-40C2-B1D7-80C30B588CB6}"/>
+                <a16:creationId xmlns:a16="http://schemas.microsoft.com/office/drawing/2014/main" xmlns="" id="{7729D843-C50E-40C2-B1D7-80C30B588CB6}"/>
               </a:ext>
             </a:extLst>
           </p:cNvPr>
@@ -2390,7 +2390,7 @@
           <p:cNvPr id="5" name="Date Placeholder 4">
             <a:extLst>
               <a:ext uri="{FF2B5EF4-FFF2-40B4-BE49-F238E27FC236}">
-                <a16:creationId xmlns="" xmlns:a16="http://schemas.microsoft.com/office/drawing/2014/main" id="{32537BE7-7D77-4A75-A96F-59FB2CF03344}"/>
+                <a16:creationId xmlns:a16="http://schemas.microsoft.com/office/drawing/2014/main" xmlns="" id="{32537BE7-7D77-4A75-A96F-59FB2CF03344}"/>
               </a:ext>
             </a:extLst>
           </p:cNvPr>
@@ -2408,7 +2408,7 @@
           <a:p>
             <a:fld id="{96F8FDAF-70E1-4658-93D8-51FF92779D9A}" type="datetimeFigureOut">
               <a:rPr lang="en-US" smtClean="0"/>
-              <a:t>4/10/2018</a:t>
+              <a:t>4/12/2018</a:t>
             </a:fld>
             <a:endParaRPr lang="en-US"/>
           </a:p>
@@ -2419,7 +2419,7 @@
           <p:cNvPr id="6" name="Footer Placeholder 5">
             <a:extLst>
               <a:ext uri="{FF2B5EF4-FFF2-40B4-BE49-F238E27FC236}">
-                <a16:creationId xmlns="" xmlns:a16="http://schemas.microsoft.com/office/drawing/2014/main" id="{B80FB7E4-4260-4BA3-B002-A3864DC76853}"/>
+                <a16:creationId xmlns:a16="http://schemas.microsoft.com/office/drawing/2014/main" xmlns="" id="{B80FB7E4-4260-4BA3-B002-A3864DC76853}"/>
               </a:ext>
             </a:extLst>
           </p:cNvPr>
@@ -2444,7 +2444,7 @@
           <p:cNvPr id="7" name="Slide Number Placeholder 6">
             <a:extLst>
               <a:ext uri="{FF2B5EF4-FFF2-40B4-BE49-F238E27FC236}">
-                <a16:creationId xmlns="" xmlns:a16="http://schemas.microsoft.com/office/drawing/2014/main" id="{8967F5E0-D04F-4A27-B26B-4ADAB8CDCEC4}"/>
+                <a16:creationId xmlns:a16="http://schemas.microsoft.com/office/drawing/2014/main" xmlns="" id="{8967F5E0-D04F-4A27-B26B-4ADAB8CDCEC4}"/>
               </a:ext>
             </a:extLst>
           </p:cNvPr>
@@ -2503,7 +2503,7 @@
           <p:cNvPr id="2" name="Title 1">
             <a:extLst>
               <a:ext uri="{FF2B5EF4-FFF2-40B4-BE49-F238E27FC236}">
-                <a16:creationId xmlns="" xmlns:a16="http://schemas.microsoft.com/office/drawing/2014/main" id="{2FA23FC2-F954-4886-8D76-B169898D631C}"/>
+                <a16:creationId xmlns:a16="http://schemas.microsoft.com/office/drawing/2014/main" xmlns="" id="{2FA23FC2-F954-4886-8D76-B169898D631C}"/>
               </a:ext>
             </a:extLst>
           </p:cNvPr>
@@ -2540,7 +2540,7 @@
           <p:cNvPr id="3" name="Picture Placeholder 2">
             <a:extLst>
               <a:ext uri="{FF2B5EF4-FFF2-40B4-BE49-F238E27FC236}">
-                <a16:creationId xmlns="" xmlns:a16="http://schemas.microsoft.com/office/drawing/2014/main" id="{F9C727F8-1854-4A8D-B02E-2FFB3BFA350F}"/>
+                <a16:creationId xmlns:a16="http://schemas.microsoft.com/office/drawing/2014/main" xmlns="" id="{F9C727F8-1854-4A8D-B02E-2FFB3BFA350F}"/>
               </a:ext>
             </a:extLst>
           </p:cNvPr>
@@ -2607,7 +2607,7 @@
           <p:cNvPr id="4" name="Text Placeholder 3">
             <a:extLst>
               <a:ext uri="{FF2B5EF4-FFF2-40B4-BE49-F238E27FC236}">
-                <a16:creationId xmlns="" xmlns:a16="http://schemas.microsoft.com/office/drawing/2014/main" id="{D860AF71-817C-4B0B-BCA0-1E41ABBFA4FD}"/>
+                <a16:creationId xmlns:a16="http://schemas.microsoft.com/office/drawing/2014/main" xmlns="" id="{D860AF71-817C-4B0B-BCA0-1E41ABBFA4FD}"/>
               </a:ext>
             </a:extLst>
           </p:cNvPr>
@@ -2678,7 +2678,7 @@
           <p:cNvPr id="5" name="Date Placeholder 4">
             <a:extLst>
               <a:ext uri="{FF2B5EF4-FFF2-40B4-BE49-F238E27FC236}">
-                <a16:creationId xmlns="" xmlns:a16="http://schemas.microsoft.com/office/drawing/2014/main" id="{44E7BAB2-983A-4ED0-B12A-FD886F20DF8D}"/>
+                <a16:creationId xmlns:a16="http://schemas.microsoft.com/office/drawing/2014/main" xmlns="" id="{44E7BAB2-983A-4ED0-B12A-FD886F20DF8D}"/>
               </a:ext>
             </a:extLst>
           </p:cNvPr>
@@ -2696,7 +2696,7 @@
           <a:p>
             <a:fld id="{96F8FDAF-70E1-4658-93D8-51FF92779D9A}" type="datetimeFigureOut">
               <a:rPr lang="en-US" smtClean="0"/>
-              <a:t>4/10/2018</a:t>
+              <a:t>4/12/2018</a:t>
             </a:fld>
             <a:endParaRPr lang="en-US"/>
           </a:p>
@@ -2707,7 +2707,7 @@
           <p:cNvPr id="6" name="Footer Placeholder 5">
             <a:extLst>
               <a:ext uri="{FF2B5EF4-FFF2-40B4-BE49-F238E27FC236}">
-                <a16:creationId xmlns="" xmlns:a16="http://schemas.microsoft.com/office/drawing/2014/main" id="{3BE090A9-96F5-4FED-A7E4-FDD121FE1972}"/>
+                <a16:creationId xmlns:a16="http://schemas.microsoft.com/office/drawing/2014/main" xmlns="" id="{3BE090A9-96F5-4FED-A7E4-FDD121FE1972}"/>
               </a:ext>
             </a:extLst>
           </p:cNvPr>
@@ -2732,7 +2732,7 @@
           <p:cNvPr id="7" name="Slide Number Placeholder 6">
             <a:extLst>
               <a:ext uri="{FF2B5EF4-FFF2-40B4-BE49-F238E27FC236}">
-                <a16:creationId xmlns="" xmlns:a16="http://schemas.microsoft.com/office/drawing/2014/main" id="{B255F445-E4AF-497A-8D51-6B48B9E0D7F9}"/>
+                <a16:creationId xmlns:a16="http://schemas.microsoft.com/office/drawing/2014/main" xmlns="" id="{B255F445-E4AF-497A-8D51-6B48B9E0D7F9}"/>
               </a:ext>
             </a:extLst>
           </p:cNvPr>
@@ -2796,7 +2796,7 @@
           <p:cNvPr id="2" name="Title Placeholder 1">
             <a:extLst>
               <a:ext uri="{FF2B5EF4-FFF2-40B4-BE49-F238E27FC236}">
-                <a16:creationId xmlns="" xmlns:a16="http://schemas.microsoft.com/office/drawing/2014/main" id="{C9843254-4CC3-437E-947E-DD3EB3E19D5F}"/>
+                <a16:creationId xmlns:a16="http://schemas.microsoft.com/office/drawing/2014/main" xmlns="" id="{C9843254-4CC3-437E-947E-DD3EB3E19D5F}"/>
               </a:ext>
             </a:extLst>
           </p:cNvPr>
@@ -2834,7 +2834,7 @@
           <p:cNvPr id="3" name="Text Placeholder 2">
             <a:extLst>
               <a:ext uri="{FF2B5EF4-FFF2-40B4-BE49-F238E27FC236}">
-                <a16:creationId xmlns="" xmlns:a16="http://schemas.microsoft.com/office/drawing/2014/main" id="{4999E38E-203C-416A-BE72-C1040CA2A01E}"/>
+                <a16:creationId xmlns:a16="http://schemas.microsoft.com/office/drawing/2014/main" xmlns="" id="{4999E38E-203C-416A-BE72-C1040CA2A01E}"/>
               </a:ext>
             </a:extLst>
           </p:cNvPr>
@@ -2901,7 +2901,7 @@
           <p:cNvPr id="4" name="Date Placeholder 3">
             <a:extLst>
               <a:ext uri="{FF2B5EF4-FFF2-40B4-BE49-F238E27FC236}">
-                <a16:creationId xmlns="" xmlns:a16="http://schemas.microsoft.com/office/drawing/2014/main" id="{7A9BE643-DE00-4490-BCA0-3199716C3D65}"/>
+                <a16:creationId xmlns:a16="http://schemas.microsoft.com/office/drawing/2014/main" xmlns="" id="{7A9BE643-DE00-4490-BCA0-3199716C3D65}"/>
               </a:ext>
             </a:extLst>
           </p:cNvPr>
@@ -2937,7 +2937,7 @@
           <a:p>
             <a:fld id="{96F8FDAF-70E1-4658-93D8-51FF92779D9A}" type="datetimeFigureOut">
               <a:rPr lang="en-US" smtClean="0"/>
-              <a:t>4/10/2018</a:t>
+              <a:t>4/12/2018</a:t>
             </a:fld>
             <a:endParaRPr lang="en-US"/>
           </a:p>
@@ -2948,7 +2948,7 @@
           <p:cNvPr id="5" name="Footer Placeholder 4">
             <a:extLst>
               <a:ext uri="{FF2B5EF4-FFF2-40B4-BE49-F238E27FC236}">
-                <a16:creationId xmlns="" xmlns:a16="http://schemas.microsoft.com/office/drawing/2014/main" id="{9C9515A2-BC45-40E6-8DBF-3B71AF8F4AE5}"/>
+                <a16:creationId xmlns:a16="http://schemas.microsoft.com/office/drawing/2014/main" xmlns="" id="{9C9515A2-BC45-40E6-8DBF-3B71AF8F4AE5}"/>
               </a:ext>
             </a:extLst>
           </p:cNvPr>
@@ -2991,7 +2991,7 @@
           <p:cNvPr id="6" name="Slide Number Placeholder 5">
             <a:extLst>
               <a:ext uri="{FF2B5EF4-FFF2-40B4-BE49-F238E27FC236}">
-                <a16:creationId xmlns="" xmlns:a16="http://schemas.microsoft.com/office/drawing/2014/main" id="{8DA9C5EE-7439-47F0-8DA6-63CB2FDF3C97}"/>
+                <a16:creationId xmlns:a16="http://schemas.microsoft.com/office/drawing/2014/main" xmlns="" id="{8DA9C5EE-7439-47F0-8DA6-63CB2FDF3C97}"/>
               </a:ext>
             </a:extLst>
           </p:cNvPr>
@@ -3370,7 +3370,7 @@
           <p:cNvPr id="23" name="Rectangle 22">
             <a:extLst>
               <a:ext uri="{FF2B5EF4-FFF2-40B4-BE49-F238E27FC236}">
-                <a16:creationId xmlns="" xmlns:a16="http://schemas.microsoft.com/office/drawing/2014/main" id="{EE1FC7B4-E4A7-4452-B413-1A623E3A7230}"/>
+                <a16:creationId xmlns:a16="http://schemas.microsoft.com/office/drawing/2014/main" xmlns="" id="{EE1FC7B4-E4A7-4452-B413-1A623E3A7230}"/>
               </a:ext>
             </a:extLst>
           </p:cNvPr>
@@ -3380,7 +3380,7 @@
           <p:nvPr>
             <p:extLst>
               <p:ext uri="{386F3935-93C4-4BCD-93E2-E3B085C9AB24}">
-                <p16:designElem xmlns="" xmlns:p16="http://schemas.microsoft.com/office/powerpoint/2015/main" val="1"/>
+                <p16:designElem xmlns:p16="http://schemas.microsoft.com/office/powerpoint/2015/main" xmlns="" val="1"/>
               </p:ext>
             </p:extLst>
           </p:nvPr>
@@ -3461,7 +3461,7 @@
           <p:cNvPr id="25" name="Freeform 13">
             <a:extLst>
               <a:ext uri="{FF2B5EF4-FFF2-40B4-BE49-F238E27FC236}">
-                <a16:creationId xmlns="" xmlns:a16="http://schemas.microsoft.com/office/drawing/2014/main" id="{E0709AF0-24F0-4486-B189-BE6386BDB198}"/>
+                <a16:creationId xmlns:a16="http://schemas.microsoft.com/office/drawing/2014/main" xmlns="" id="{E0709AF0-24F0-4486-B189-BE6386BDB198}"/>
               </a:ext>
             </a:extLst>
           </p:cNvPr>
@@ -3471,7 +3471,7 @@
           <p:nvPr>
             <p:extLst>
               <p:ext uri="{386F3935-93C4-4BCD-93E2-E3B085C9AB24}">
-                <p16:designElem xmlns="" xmlns:p16="http://schemas.microsoft.com/office/powerpoint/2015/main" val="1"/>
+                <p16:designElem xmlns:p16="http://schemas.microsoft.com/office/powerpoint/2015/main" xmlns="" val="1"/>
               </p:ext>
             </p:extLst>
           </p:nvPr>
@@ -3595,7 +3595,7 @@
           <p:cNvPr id="27" name="Freeform 11">
             <a:extLst>
               <a:ext uri="{FF2B5EF4-FFF2-40B4-BE49-F238E27FC236}">
-                <a16:creationId xmlns="" xmlns:a16="http://schemas.microsoft.com/office/drawing/2014/main" id="{FBE3B62F-5853-4A3C-B050-6186351A7176}"/>
+                <a16:creationId xmlns:a16="http://schemas.microsoft.com/office/drawing/2014/main" xmlns="" id="{FBE3B62F-5853-4A3C-B050-6186351A7176}"/>
               </a:ext>
             </a:extLst>
           </p:cNvPr>
@@ -3605,7 +3605,7 @@
           <p:nvPr>
             <p:extLst>
               <p:ext uri="{386F3935-93C4-4BCD-93E2-E3B085C9AB24}">
-                <p16:designElem xmlns="" xmlns:p16="http://schemas.microsoft.com/office/powerpoint/2015/main" val="1"/>
+                <p16:designElem xmlns:p16="http://schemas.microsoft.com/office/powerpoint/2015/main" xmlns="" val="1"/>
               </p:ext>
             </p:extLst>
           </p:nvPr>
@@ -3731,7 +3731,7 @@
           <p:cNvPr id="15" name="Title 1">
             <a:extLst>
               <a:ext uri="{FF2B5EF4-FFF2-40B4-BE49-F238E27FC236}">
-                <a16:creationId xmlns="" xmlns:a16="http://schemas.microsoft.com/office/drawing/2014/main" id="{48EC109C-56A4-422C-9F35-8567F8D624CE}"/>
+                <a16:creationId xmlns:a16="http://schemas.microsoft.com/office/drawing/2014/main" xmlns="" id="{48EC109C-56A4-422C-9F35-8567F8D624CE}"/>
               </a:ext>
             </a:extLst>
           </p:cNvPr>
@@ -3788,7 +3788,7 @@
           <p:cNvPr id="16" name="Picture 15">
             <a:extLst>
               <a:ext uri="{FF2B5EF4-FFF2-40B4-BE49-F238E27FC236}">
-                <a16:creationId xmlns="" xmlns:a16="http://schemas.microsoft.com/office/drawing/2014/main" id="{F6726E6B-363C-4E50-8446-79407E2AEB25}"/>
+                <a16:creationId xmlns:a16="http://schemas.microsoft.com/office/drawing/2014/main" xmlns="" id="{F6726E6B-363C-4E50-8446-79407E2AEB25}"/>
               </a:ext>
             </a:extLst>
           </p:cNvPr>
@@ -3824,7 +3824,7 @@
           <p:cNvPr id="19" name="TextBox 18">
             <a:extLst>
               <a:ext uri="{FF2B5EF4-FFF2-40B4-BE49-F238E27FC236}">
-                <a16:creationId xmlns="" xmlns:a16="http://schemas.microsoft.com/office/drawing/2014/main" id="{0853C66F-B064-4E12-9E48-5D11B374C147}"/>
+                <a16:creationId xmlns:a16="http://schemas.microsoft.com/office/drawing/2014/main" xmlns="" id="{0853C66F-B064-4E12-9E48-5D11B374C147}"/>
               </a:ext>
             </a:extLst>
           </p:cNvPr>
@@ -3911,7 +3911,7 @@
           <p:cNvPr id="23" name="Rectangle 22">
             <a:extLst>
               <a:ext uri="{FF2B5EF4-FFF2-40B4-BE49-F238E27FC236}">
-                <a16:creationId xmlns="" xmlns:a16="http://schemas.microsoft.com/office/drawing/2014/main" id="{EE1FC7B4-E4A7-4452-B413-1A623E3A7230}"/>
+                <a16:creationId xmlns:a16="http://schemas.microsoft.com/office/drawing/2014/main" xmlns="" id="{EE1FC7B4-E4A7-4452-B413-1A623E3A7230}"/>
               </a:ext>
             </a:extLst>
           </p:cNvPr>
@@ -3921,7 +3921,7 @@
           <p:nvPr>
             <p:extLst>
               <p:ext uri="{386F3935-93C4-4BCD-93E2-E3B085C9AB24}">
-                <p16:designElem xmlns="" xmlns:p16="http://schemas.microsoft.com/office/powerpoint/2015/main" val="1"/>
+                <p16:designElem xmlns:p16="http://schemas.microsoft.com/office/powerpoint/2015/main" xmlns="" val="1"/>
               </p:ext>
             </p:extLst>
           </p:nvPr>
@@ -4002,7 +4002,7 @@
           <p:cNvPr id="25" name="Freeform 13">
             <a:extLst>
               <a:ext uri="{FF2B5EF4-FFF2-40B4-BE49-F238E27FC236}">
-                <a16:creationId xmlns="" xmlns:a16="http://schemas.microsoft.com/office/drawing/2014/main" id="{E0709AF0-24F0-4486-B189-BE6386BDB198}"/>
+                <a16:creationId xmlns:a16="http://schemas.microsoft.com/office/drawing/2014/main" xmlns="" id="{E0709AF0-24F0-4486-B189-BE6386BDB198}"/>
               </a:ext>
             </a:extLst>
           </p:cNvPr>
@@ -4012,7 +4012,7 @@
           <p:nvPr>
             <p:extLst>
               <p:ext uri="{386F3935-93C4-4BCD-93E2-E3B085C9AB24}">
-                <p16:designElem xmlns="" xmlns:p16="http://schemas.microsoft.com/office/powerpoint/2015/main" val="1"/>
+                <p16:designElem xmlns:p16="http://schemas.microsoft.com/office/powerpoint/2015/main" xmlns="" val="1"/>
               </p:ext>
             </p:extLst>
           </p:nvPr>
@@ -4136,7 +4136,7 @@
           <p:cNvPr id="27" name="Freeform 11">
             <a:extLst>
               <a:ext uri="{FF2B5EF4-FFF2-40B4-BE49-F238E27FC236}">
-                <a16:creationId xmlns="" xmlns:a16="http://schemas.microsoft.com/office/drawing/2014/main" id="{FBE3B62F-5853-4A3C-B050-6186351A7176}"/>
+                <a16:creationId xmlns:a16="http://schemas.microsoft.com/office/drawing/2014/main" xmlns="" id="{FBE3B62F-5853-4A3C-B050-6186351A7176}"/>
               </a:ext>
             </a:extLst>
           </p:cNvPr>
@@ -4146,7 +4146,7 @@
           <p:nvPr>
             <p:extLst>
               <p:ext uri="{386F3935-93C4-4BCD-93E2-E3B085C9AB24}">
-                <p16:designElem xmlns="" xmlns:p16="http://schemas.microsoft.com/office/powerpoint/2015/main" val="1"/>
+                <p16:designElem xmlns:p16="http://schemas.microsoft.com/office/powerpoint/2015/main" xmlns="" val="1"/>
               </p:ext>
             </p:extLst>
           </p:nvPr>
@@ -4272,7 +4272,7 @@
           <p:cNvPr id="2" name="Title 1">
             <a:extLst>
               <a:ext uri="{FF2B5EF4-FFF2-40B4-BE49-F238E27FC236}">
-                <a16:creationId xmlns="" xmlns:a16="http://schemas.microsoft.com/office/drawing/2014/main" id="{A5F6196D-B07E-499E-92C0-6953CE9F25D4}"/>
+                <a16:creationId xmlns:a16="http://schemas.microsoft.com/office/drawing/2014/main" xmlns="" id="{A5F6196D-B07E-499E-92C0-6953CE9F25D4}"/>
               </a:ext>
             </a:extLst>
           </p:cNvPr>
@@ -4297,11 +4297,7 @@
           <a:p>
             <a:r>
               <a:rPr lang="en-US" b="1" dirty="0" smtClean="0"/>
-              <a:t>Counting</a:t>
-            </a:r>
-            <a:r>
-              <a:rPr lang="en-US" b="1" dirty="0" smtClean="0"/>
-              <a:t>… (Signed)</a:t>
+              <a:t>Counting… (Signed)</a:t>
             </a:r>
             <a:endParaRPr lang="en-US" b="1" dirty="0"/>
           </a:p>
@@ -4312,7 +4308,7 @@
           <p:cNvPr id="15" name="Content Placeholder 16">
             <a:extLst>
               <a:ext uri="{FF2B5EF4-FFF2-40B4-BE49-F238E27FC236}">
-                <a16:creationId xmlns="" xmlns:a16="http://schemas.microsoft.com/office/drawing/2014/main" id="{5FDBA27F-9676-4EE6-B75A-C35B42A0CD81}"/>
+                <a16:creationId xmlns:a16="http://schemas.microsoft.com/office/drawing/2014/main" xmlns="" id="{5FDBA27F-9676-4EE6-B75A-C35B42A0CD81}"/>
               </a:ext>
             </a:extLst>
           </p:cNvPr>
@@ -4508,7 +4504,7 @@
           <p:cNvPr id="18" name="Content Placeholder 16">
             <a:extLst>
               <a:ext uri="{FF2B5EF4-FFF2-40B4-BE49-F238E27FC236}">
-                <a16:creationId xmlns="" xmlns:a16="http://schemas.microsoft.com/office/drawing/2014/main" id="{5FDBA27F-9676-4EE6-B75A-C35B42A0CD81}"/>
+                <a16:creationId xmlns:a16="http://schemas.microsoft.com/office/drawing/2014/main" xmlns="" id="{5FDBA27F-9676-4EE6-B75A-C35B42A0CD81}"/>
               </a:ext>
             </a:extLst>
           </p:cNvPr>
@@ -5158,7 +5154,7 @@
           <p:cNvPr id="23" name="Rectangle 22">
             <a:extLst>
               <a:ext uri="{FF2B5EF4-FFF2-40B4-BE49-F238E27FC236}">
-                <a16:creationId xmlns="" xmlns:a16="http://schemas.microsoft.com/office/drawing/2014/main" id="{EE1FC7B4-E4A7-4452-B413-1A623E3A7230}"/>
+                <a16:creationId xmlns:a16="http://schemas.microsoft.com/office/drawing/2014/main" xmlns="" id="{EE1FC7B4-E4A7-4452-B413-1A623E3A7230}"/>
               </a:ext>
             </a:extLst>
           </p:cNvPr>
@@ -5168,7 +5164,7 @@
           <p:nvPr>
             <p:extLst>
               <p:ext uri="{386F3935-93C4-4BCD-93E2-E3B085C9AB24}">
-                <p16:designElem xmlns="" xmlns:p16="http://schemas.microsoft.com/office/powerpoint/2015/main" val="1"/>
+                <p16:designElem xmlns:p16="http://schemas.microsoft.com/office/powerpoint/2015/main" xmlns="" val="1"/>
               </p:ext>
             </p:extLst>
           </p:nvPr>
@@ -5249,7 +5245,7 @@
           <p:cNvPr id="25" name="Freeform 13">
             <a:extLst>
               <a:ext uri="{FF2B5EF4-FFF2-40B4-BE49-F238E27FC236}">
-                <a16:creationId xmlns="" xmlns:a16="http://schemas.microsoft.com/office/drawing/2014/main" id="{E0709AF0-24F0-4486-B189-BE6386BDB198}"/>
+                <a16:creationId xmlns:a16="http://schemas.microsoft.com/office/drawing/2014/main" xmlns="" id="{E0709AF0-24F0-4486-B189-BE6386BDB198}"/>
               </a:ext>
             </a:extLst>
           </p:cNvPr>
@@ -5259,7 +5255,7 @@
           <p:nvPr>
             <p:extLst>
               <p:ext uri="{386F3935-93C4-4BCD-93E2-E3B085C9AB24}">
-                <p16:designElem xmlns="" xmlns:p16="http://schemas.microsoft.com/office/powerpoint/2015/main" val="1"/>
+                <p16:designElem xmlns:p16="http://schemas.microsoft.com/office/powerpoint/2015/main" xmlns="" val="1"/>
               </p:ext>
             </p:extLst>
           </p:nvPr>
@@ -5383,7 +5379,7 @@
           <p:cNvPr id="27" name="Freeform 11">
             <a:extLst>
               <a:ext uri="{FF2B5EF4-FFF2-40B4-BE49-F238E27FC236}">
-                <a16:creationId xmlns="" xmlns:a16="http://schemas.microsoft.com/office/drawing/2014/main" id="{FBE3B62F-5853-4A3C-B050-6186351A7176}"/>
+                <a16:creationId xmlns:a16="http://schemas.microsoft.com/office/drawing/2014/main" xmlns="" id="{FBE3B62F-5853-4A3C-B050-6186351A7176}"/>
               </a:ext>
             </a:extLst>
           </p:cNvPr>
@@ -5393,7 +5389,7 @@
           <p:nvPr>
             <p:extLst>
               <p:ext uri="{386F3935-93C4-4BCD-93E2-E3B085C9AB24}">
-                <p16:designElem xmlns="" xmlns:p16="http://schemas.microsoft.com/office/powerpoint/2015/main" val="1"/>
+                <p16:designElem xmlns:p16="http://schemas.microsoft.com/office/powerpoint/2015/main" xmlns="" val="1"/>
               </p:ext>
             </p:extLst>
           </p:nvPr>
@@ -5519,7 +5515,7 @@
           <p:cNvPr id="2" name="Title 1">
             <a:extLst>
               <a:ext uri="{FF2B5EF4-FFF2-40B4-BE49-F238E27FC236}">
-                <a16:creationId xmlns="" xmlns:a16="http://schemas.microsoft.com/office/drawing/2014/main" id="{A5F6196D-B07E-499E-92C0-6953CE9F25D4}"/>
+                <a16:creationId xmlns:a16="http://schemas.microsoft.com/office/drawing/2014/main" xmlns="" id="{A5F6196D-B07E-499E-92C0-6953CE9F25D4}"/>
               </a:ext>
             </a:extLst>
           </p:cNvPr>
@@ -5544,11 +5540,7 @@
           <a:p>
             <a:r>
               <a:rPr lang="en-US" b="1" dirty="0" smtClean="0"/>
-              <a:t>Counting</a:t>
-            </a:r>
-            <a:r>
-              <a:rPr lang="en-US" b="1" dirty="0" smtClean="0"/>
-              <a:t>… (Signed)</a:t>
+              <a:t>Counting… (Signed)</a:t>
             </a:r>
             <a:endParaRPr lang="en-US" b="1" dirty="0"/>
           </a:p>
@@ -5559,7 +5551,7 @@
           <p:cNvPr id="15" name="Content Placeholder 16">
             <a:extLst>
               <a:ext uri="{FF2B5EF4-FFF2-40B4-BE49-F238E27FC236}">
-                <a16:creationId xmlns="" xmlns:a16="http://schemas.microsoft.com/office/drawing/2014/main" id="{5FDBA27F-9676-4EE6-B75A-C35B42A0CD81}"/>
+                <a16:creationId xmlns:a16="http://schemas.microsoft.com/office/drawing/2014/main" xmlns="" id="{5FDBA27F-9676-4EE6-B75A-C35B42A0CD81}"/>
               </a:ext>
             </a:extLst>
           </p:cNvPr>
@@ -5755,7 +5747,7 @@
           <p:cNvPr id="18" name="Content Placeholder 16">
             <a:extLst>
               <a:ext uri="{FF2B5EF4-FFF2-40B4-BE49-F238E27FC236}">
-                <a16:creationId xmlns="" xmlns:a16="http://schemas.microsoft.com/office/drawing/2014/main" id="{5FDBA27F-9676-4EE6-B75A-C35B42A0CD81}"/>
+                <a16:creationId xmlns:a16="http://schemas.microsoft.com/office/drawing/2014/main" xmlns="" id="{5FDBA27F-9676-4EE6-B75A-C35B42A0CD81}"/>
               </a:ext>
             </a:extLst>
           </p:cNvPr>
@@ -6659,7 +6651,7 @@
           <p:cNvPr id="23" name="Rectangle 22">
             <a:extLst>
               <a:ext uri="{FF2B5EF4-FFF2-40B4-BE49-F238E27FC236}">
-                <a16:creationId xmlns="" xmlns:a16="http://schemas.microsoft.com/office/drawing/2014/main" id="{EE1FC7B4-E4A7-4452-B413-1A623E3A7230}"/>
+                <a16:creationId xmlns:a16="http://schemas.microsoft.com/office/drawing/2014/main" xmlns="" id="{EE1FC7B4-E4A7-4452-B413-1A623E3A7230}"/>
               </a:ext>
             </a:extLst>
           </p:cNvPr>
@@ -6669,7 +6661,7 @@
           <p:nvPr>
             <p:extLst>
               <p:ext uri="{386F3935-93C4-4BCD-93E2-E3B085C9AB24}">
-                <p16:designElem xmlns="" xmlns:p16="http://schemas.microsoft.com/office/powerpoint/2015/main" val="1"/>
+                <p16:designElem xmlns:p16="http://schemas.microsoft.com/office/powerpoint/2015/main" xmlns="" val="1"/>
               </p:ext>
             </p:extLst>
           </p:nvPr>
@@ -6750,7 +6742,7 @@
           <p:cNvPr id="25" name="Freeform 13">
             <a:extLst>
               <a:ext uri="{FF2B5EF4-FFF2-40B4-BE49-F238E27FC236}">
-                <a16:creationId xmlns="" xmlns:a16="http://schemas.microsoft.com/office/drawing/2014/main" id="{E0709AF0-24F0-4486-B189-BE6386BDB198}"/>
+                <a16:creationId xmlns:a16="http://schemas.microsoft.com/office/drawing/2014/main" xmlns="" id="{E0709AF0-24F0-4486-B189-BE6386BDB198}"/>
               </a:ext>
             </a:extLst>
           </p:cNvPr>
@@ -6760,7 +6752,7 @@
           <p:nvPr>
             <p:extLst>
               <p:ext uri="{386F3935-93C4-4BCD-93E2-E3B085C9AB24}">
-                <p16:designElem xmlns="" xmlns:p16="http://schemas.microsoft.com/office/powerpoint/2015/main" val="1"/>
+                <p16:designElem xmlns:p16="http://schemas.microsoft.com/office/powerpoint/2015/main" xmlns="" val="1"/>
               </p:ext>
             </p:extLst>
           </p:nvPr>
@@ -6884,7 +6876,7 @@
           <p:cNvPr id="27" name="Freeform 11">
             <a:extLst>
               <a:ext uri="{FF2B5EF4-FFF2-40B4-BE49-F238E27FC236}">
-                <a16:creationId xmlns="" xmlns:a16="http://schemas.microsoft.com/office/drawing/2014/main" id="{FBE3B62F-5853-4A3C-B050-6186351A7176}"/>
+                <a16:creationId xmlns:a16="http://schemas.microsoft.com/office/drawing/2014/main" xmlns="" id="{FBE3B62F-5853-4A3C-B050-6186351A7176}"/>
               </a:ext>
             </a:extLst>
           </p:cNvPr>
@@ -6894,7 +6886,7 @@
           <p:nvPr>
             <p:extLst>
               <p:ext uri="{386F3935-93C4-4BCD-93E2-E3B085C9AB24}">
-                <p16:designElem xmlns="" xmlns:p16="http://schemas.microsoft.com/office/powerpoint/2015/main" val="1"/>
+                <p16:designElem xmlns:p16="http://schemas.microsoft.com/office/powerpoint/2015/main" xmlns="" val="1"/>
               </p:ext>
             </p:extLst>
           </p:nvPr>
@@ -7020,7 +7012,7 @@
           <p:cNvPr id="2" name="Title 1">
             <a:extLst>
               <a:ext uri="{FF2B5EF4-FFF2-40B4-BE49-F238E27FC236}">
-                <a16:creationId xmlns="" xmlns:a16="http://schemas.microsoft.com/office/drawing/2014/main" id="{A5F6196D-B07E-499E-92C0-6953CE9F25D4}"/>
+                <a16:creationId xmlns:a16="http://schemas.microsoft.com/office/drawing/2014/main" xmlns="" id="{A5F6196D-B07E-499E-92C0-6953CE9F25D4}"/>
               </a:ext>
             </a:extLst>
           </p:cNvPr>
@@ -7057,7 +7049,7 @@
           <p:cNvPr id="17" name="Content Placeholder 16">
             <a:extLst>
               <a:ext uri="{FF2B5EF4-FFF2-40B4-BE49-F238E27FC236}">
-                <a16:creationId xmlns="" xmlns:a16="http://schemas.microsoft.com/office/drawing/2014/main" id="{5FDBA27F-9676-4EE6-B75A-C35B42A0CD81}"/>
+                <a16:creationId xmlns:a16="http://schemas.microsoft.com/office/drawing/2014/main" xmlns="" id="{5FDBA27F-9676-4EE6-B75A-C35B42A0CD81}"/>
               </a:ext>
             </a:extLst>
           </p:cNvPr>
@@ -7098,7 +7090,7 @@
           <p:cNvPr id="15" name="Content Placeholder 16">
             <a:extLst>
               <a:ext uri="{FF2B5EF4-FFF2-40B4-BE49-F238E27FC236}">
-                <a16:creationId xmlns="" xmlns:a16="http://schemas.microsoft.com/office/drawing/2014/main" id="{5FDBA27F-9676-4EE6-B75A-C35B42A0CD81}"/>
+                <a16:creationId xmlns:a16="http://schemas.microsoft.com/office/drawing/2014/main" xmlns="" id="{5FDBA27F-9676-4EE6-B75A-C35B42A0CD81}"/>
               </a:ext>
             </a:extLst>
           </p:cNvPr>
@@ -7294,7 +7286,7 @@
           <p:cNvPr id="18" name="Content Placeholder 16">
             <a:extLst>
               <a:ext uri="{FF2B5EF4-FFF2-40B4-BE49-F238E27FC236}">
-                <a16:creationId xmlns="" xmlns:a16="http://schemas.microsoft.com/office/drawing/2014/main" id="{5FDBA27F-9676-4EE6-B75A-C35B42A0CD81}"/>
+                <a16:creationId xmlns:a16="http://schemas.microsoft.com/office/drawing/2014/main" xmlns="" id="{5FDBA27F-9676-4EE6-B75A-C35B42A0CD81}"/>
               </a:ext>
             </a:extLst>
           </p:cNvPr>
@@ -7515,7 +7507,6 @@
               <a:rPr lang="en-US" dirty="0"/>
               <a:t>http://www.mathcs.emory.edu</a:t>
             </a:r>
-            <a:endParaRPr lang="en-US" dirty="0"/>
           </a:p>
         </p:txBody>
       </p:sp>
@@ -7596,7 +7587,7 @@
           <p:cNvPr id="23" name="Rectangle 22">
             <a:extLst>
               <a:ext uri="{FF2B5EF4-FFF2-40B4-BE49-F238E27FC236}">
-                <a16:creationId xmlns="" xmlns:a16="http://schemas.microsoft.com/office/drawing/2014/main" id="{EE1FC7B4-E4A7-4452-B413-1A623E3A7230}"/>
+                <a16:creationId xmlns:a16="http://schemas.microsoft.com/office/drawing/2014/main" xmlns="" id="{EE1FC7B4-E4A7-4452-B413-1A623E3A7230}"/>
               </a:ext>
             </a:extLst>
           </p:cNvPr>
@@ -7606,7 +7597,7 @@
           <p:nvPr>
             <p:extLst>
               <p:ext uri="{386F3935-93C4-4BCD-93E2-E3B085C9AB24}">
-                <p16:designElem xmlns="" xmlns:p16="http://schemas.microsoft.com/office/powerpoint/2015/main" val="1"/>
+                <p16:designElem xmlns:p16="http://schemas.microsoft.com/office/powerpoint/2015/main" xmlns="" val="1"/>
               </p:ext>
             </p:extLst>
           </p:nvPr>
@@ -7687,7 +7678,7 @@
           <p:cNvPr id="25" name="Freeform 13">
             <a:extLst>
               <a:ext uri="{FF2B5EF4-FFF2-40B4-BE49-F238E27FC236}">
-                <a16:creationId xmlns="" xmlns:a16="http://schemas.microsoft.com/office/drawing/2014/main" id="{E0709AF0-24F0-4486-B189-BE6386BDB198}"/>
+                <a16:creationId xmlns:a16="http://schemas.microsoft.com/office/drawing/2014/main" xmlns="" id="{E0709AF0-24F0-4486-B189-BE6386BDB198}"/>
               </a:ext>
             </a:extLst>
           </p:cNvPr>
@@ -7697,7 +7688,7 @@
           <p:nvPr>
             <p:extLst>
               <p:ext uri="{386F3935-93C4-4BCD-93E2-E3B085C9AB24}">
-                <p16:designElem xmlns="" xmlns:p16="http://schemas.microsoft.com/office/powerpoint/2015/main" val="1"/>
+                <p16:designElem xmlns:p16="http://schemas.microsoft.com/office/powerpoint/2015/main" xmlns="" val="1"/>
               </p:ext>
             </p:extLst>
           </p:nvPr>
@@ -7821,7 +7812,7 @@
           <p:cNvPr id="27" name="Freeform 11">
             <a:extLst>
               <a:ext uri="{FF2B5EF4-FFF2-40B4-BE49-F238E27FC236}">
-                <a16:creationId xmlns="" xmlns:a16="http://schemas.microsoft.com/office/drawing/2014/main" id="{FBE3B62F-5853-4A3C-B050-6186351A7176}"/>
+                <a16:creationId xmlns:a16="http://schemas.microsoft.com/office/drawing/2014/main" xmlns="" id="{FBE3B62F-5853-4A3C-B050-6186351A7176}"/>
               </a:ext>
             </a:extLst>
           </p:cNvPr>
@@ -7831,7 +7822,7 @@
           <p:nvPr>
             <p:extLst>
               <p:ext uri="{386F3935-93C4-4BCD-93E2-E3B085C9AB24}">
-                <p16:designElem xmlns="" xmlns:p16="http://schemas.microsoft.com/office/powerpoint/2015/main" val="1"/>
+                <p16:designElem xmlns:p16="http://schemas.microsoft.com/office/powerpoint/2015/main" xmlns="" val="1"/>
               </p:ext>
             </p:extLst>
           </p:nvPr>
@@ -7957,7 +7948,7 @@
           <p:cNvPr id="2" name="Title 1">
             <a:extLst>
               <a:ext uri="{FF2B5EF4-FFF2-40B4-BE49-F238E27FC236}">
-                <a16:creationId xmlns="" xmlns:a16="http://schemas.microsoft.com/office/drawing/2014/main" id="{A5F6196D-B07E-499E-92C0-6953CE9F25D4}"/>
+                <a16:creationId xmlns:a16="http://schemas.microsoft.com/office/drawing/2014/main" xmlns="" id="{A5F6196D-B07E-499E-92C0-6953CE9F25D4}"/>
               </a:ext>
             </a:extLst>
           </p:cNvPr>
@@ -7994,7 +7985,7 @@
           <p:cNvPr id="17" name="Content Placeholder 16">
             <a:extLst>
               <a:ext uri="{FF2B5EF4-FFF2-40B4-BE49-F238E27FC236}">
-                <a16:creationId xmlns="" xmlns:a16="http://schemas.microsoft.com/office/drawing/2014/main" id="{5FDBA27F-9676-4EE6-B75A-C35B42A0CD81}"/>
+                <a16:creationId xmlns:a16="http://schemas.microsoft.com/office/drawing/2014/main" xmlns="" id="{5FDBA27F-9676-4EE6-B75A-C35B42A0CD81}"/>
               </a:ext>
             </a:extLst>
           </p:cNvPr>
@@ -8041,7 +8032,7 @@
           <p:cNvPr id="15" name="Content Placeholder 16">
             <a:extLst>
               <a:ext uri="{FF2B5EF4-FFF2-40B4-BE49-F238E27FC236}">
-                <a16:creationId xmlns="" xmlns:a16="http://schemas.microsoft.com/office/drawing/2014/main" id="{5FDBA27F-9676-4EE6-B75A-C35B42A0CD81}"/>
+                <a16:creationId xmlns:a16="http://schemas.microsoft.com/office/drawing/2014/main" xmlns="" id="{5FDBA27F-9676-4EE6-B75A-C35B42A0CD81}"/>
               </a:ext>
             </a:extLst>
           </p:cNvPr>
@@ -8237,7 +8228,7 @@
           <p:cNvPr id="18" name="Content Placeholder 16">
             <a:extLst>
               <a:ext uri="{FF2B5EF4-FFF2-40B4-BE49-F238E27FC236}">
-                <a16:creationId xmlns="" xmlns:a16="http://schemas.microsoft.com/office/drawing/2014/main" id="{5FDBA27F-9676-4EE6-B75A-C35B42A0CD81}"/>
+                <a16:creationId xmlns:a16="http://schemas.microsoft.com/office/drawing/2014/main" xmlns="" id="{5FDBA27F-9676-4EE6-B75A-C35B42A0CD81}"/>
               </a:ext>
             </a:extLst>
           </p:cNvPr>
@@ -8541,7 +8532,7 @@
           <p:cNvPr id="23" name="Rectangle 22">
             <a:extLst>
               <a:ext uri="{FF2B5EF4-FFF2-40B4-BE49-F238E27FC236}">
-                <a16:creationId xmlns="" xmlns:a16="http://schemas.microsoft.com/office/drawing/2014/main" id="{EE1FC7B4-E4A7-4452-B413-1A623E3A7230}"/>
+                <a16:creationId xmlns:a16="http://schemas.microsoft.com/office/drawing/2014/main" xmlns="" id="{EE1FC7B4-E4A7-4452-B413-1A623E3A7230}"/>
               </a:ext>
             </a:extLst>
           </p:cNvPr>
@@ -8551,7 +8542,7 @@
           <p:nvPr>
             <p:extLst>
               <p:ext uri="{386F3935-93C4-4BCD-93E2-E3B085C9AB24}">
-                <p16:designElem xmlns="" xmlns:p16="http://schemas.microsoft.com/office/powerpoint/2015/main" val="1"/>
+                <p16:designElem xmlns:p16="http://schemas.microsoft.com/office/powerpoint/2015/main" xmlns="" val="1"/>
               </p:ext>
             </p:extLst>
           </p:nvPr>
@@ -8632,7 +8623,7 @@
           <p:cNvPr id="25" name="Freeform 13">
             <a:extLst>
               <a:ext uri="{FF2B5EF4-FFF2-40B4-BE49-F238E27FC236}">
-                <a16:creationId xmlns="" xmlns:a16="http://schemas.microsoft.com/office/drawing/2014/main" id="{E0709AF0-24F0-4486-B189-BE6386BDB198}"/>
+                <a16:creationId xmlns:a16="http://schemas.microsoft.com/office/drawing/2014/main" xmlns="" id="{E0709AF0-24F0-4486-B189-BE6386BDB198}"/>
               </a:ext>
             </a:extLst>
           </p:cNvPr>
@@ -8642,7 +8633,7 @@
           <p:nvPr>
             <p:extLst>
               <p:ext uri="{386F3935-93C4-4BCD-93E2-E3B085C9AB24}">
-                <p16:designElem xmlns="" xmlns:p16="http://schemas.microsoft.com/office/powerpoint/2015/main" val="1"/>
+                <p16:designElem xmlns:p16="http://schemas.microsoft.com/office/powerpoint/2015/main" xmlns="" val="1"/>
               </p:ext>
             </p:extLst>
           </p:nvPr>
@@ -8766,7 +8757,7 @@
           <p:cNvPr id="27" name="Freeform 11">
             <a:extLst>
               <a:ext uri="{FF2B5EF4-FFF2-40B4-BE49-F238E27FC236}">
-                <a16:creationId xmlns="" xmlns:a16="http://schemas.microsoft.com/office/drawing/2014/main" id="{FBE3B62F-5853-4A3C-B050-6186351A7176}"/>
+                <a16:creationId xmlns:a16="http://schemas.microsoft.com/office/drawing/2014/main" xmlns="" id="{FBE3B62F-5853-4A3C-B050-6186351A7176}"/>
               </a:ext>
             </a:extLst>
           </p:cNvPr>
@@ -8776,7 +8767,7 @@
           <p:nvPr>
             <p:extLst>
               <p:ext uri="{386F3935-93C4-4BCD-93E2-E3B085C9AB24}">
-                <p16:designElem xmlns="" xmlns:p16="http://schemas.microsoft.com/office/powerpoint/2015/main" val="1"/>
+                <p16:designElem xmlns:p16="http://schemas.microsoft.com/office/powerpoint/2015/main" xmlns="" val="1"/>
               </p:ext>
             </p:extLst>
           </p:nvPr>
@@ -8902,7 +8893,7 @@
           <p:cNvPr id="2" name="Title 1">
             <a:extLst>
               <a:ext uri="{FF2B5EF4-FFF2-40B4-BE49-F238E27FC236}">
-                <a16:creationId xmlns="" xmlns:a16="http://schemas.microsoft.com/office/drawing/2014/main" id="{A5F6196D-B07E-499E-92C0-6953CE9F25D4}"/>
+                <a16:creationId xmlns:a16="http://schemas.microsoft.com/office/drawing/2014/main" xmlns="" id="{A5F6196D-B07E-499E-92C0-6953CE9F25D4}"/>
               </a:ext>
             </a:extLst>
           </p:cNvPr>
@@ -8939,7 +8930,7 @@
           <p:cNvPr id="17" name="Content Placeholder 16">
             <a:extLst>
               <a:ext uri="{FF2B5EF4-FFF2-40B4-BE49-F238E27FC236}">
-                <a16:creationId xmlns="" xmlns:a16="http://schemas.microsoft.com/office/drawing/2014/main" id="{5FDBA27F-9676-4EE6-B75A-C35B42A0CD81}"/>
+                <a16:creationId xmlns:a16="http://schemas.microsoft.com/office/drawing/2014/main" xmlns="" id="{5FDBA27F-9676-4EE6-B75A-C35B42A0CD81}"/>
               </a:ext>
             </a:extLst>
           </p:cNvPr>
@@ -8986,7 +8977,7 @@
           <p:cNvPr id="15" name="Content Placeholder 16">
             <a:extLst>
               <a:ext uri="{FF2B5EF4-FFF2-40B4-BE49-F238E27FC236}">
-                <a16:creationId xmlns="" xmlns:a16="http://schemas.microsoft.com/office/drawing/2014/main" id="{5FDBA27F-9676-4EE6-B75A-C35B42A0CD81}"/>
+                <a16:creationId xmlns:a16="http://schemas.microsoft.com/office/drawing/2014/main" xmlns="" id="{5FDBA27F-9676-4EE6-B75A-C35B42A0CD81}"/>
               </a:ext>
             </a:extLst>
           </p:cNvPr>
@@ -9182,7 +9173,7 @@
           <p:cNvPr id="18" name="Content Placeholder 16">
             <a:extLst>
               <a:ext uri="{FF2B5EF4-FFF2-40B4-BE49-F238E27FC236}">
-                <a16:creationId xmlns="" xmlns:a16="http://schemas.microsoft.com/office/drawing/2014/main" id="{5FDBA27F-9676-4EE6-B75A-C35B42A0CD81}"/>
+                <a16:creationId xmlns:a16="http://schemas.microsoft.com/office/drawing/2014/main" xmlns="" id="{5FDBA27F-9676-4EE6-B75A-C35B42A0CD81}"/>
               </a:ext>
             </a:extLst>
           </p:cNvPr>
@@ -9480,7 +9471,7 @@
           <p:cNvPr id="23" name="Rectangle 22">
             <a:extLst>
               <a:ext uri="{FF2B5EF4-FFF2-40B4-BE49-F238E27FC236}">
-                <a16:creationId xmlns="" xmlns:a16="http://schemas.microsoft.com/office/drawing/2014/main" id="{EE1FC7B4-E4A7-4452-B413-1A623E3A7230}"/>
+                <a16:creationId xmlns:a16="http://schemas.microsoft.com/office/drawing/2014/main" xmlns="" id="{EE1FC7B4-E4A7-4452-B413-1A623E3A7230}"/>
               </a:ext>
             </a:extLst>
           </p:cNvPr>
@@ -9490,7 +9481,7 @@
           <p:nvPr>
             <p:extLst>
               <p:ext uri="{386F3935-93C4-4BCD-93E2-E3B085C9AB24}">
-                <p16:designElem xmlns="" xmlns:p16="http://schemas.microsoft.com/office/powerpoint/2015/main" val="1"/>
+                <p16:designElem xmlns:p16="http://schemas.microsoft.com/office/powerpoint/2015/main" xmlns="" val="1"/>
               </p:ext>
             </p:extLst>
           </p:nvPr>
@@ -9571,7 +9562,7 @@
           <p:cNvPr id="25" name="Freeform 13">
             <a:extLst>
               <a:ext uri="{FF2B5EF4-FFF2-40B4-BE49-F238E27FC236}">
-                <a16:creationId xmlns="" xmlns:a16="http://schemas.microsoft.com/office/drawing/2014/main" id="{E0709AF0-24F0-4486-B189-BE6386BDB198}"/>
+                <a16:creationId xmlns:a16="http://schemas.microsoft.com/office/drawing/2014/main" xmlns="" id="{E0709AF0-24F0-4486-B189-BE6386BDB198}"/>
               </a:ext>
             </a:extLst>
           </p:cNvPr>
@@ -9581,7 +9572,7 @@
           <p:nvPr>
             <p:extLst>
               <p:ext uri="{386F3935-93C4-4BCD-93E2-E3B085C9AB24}">
-                <p16:designElem xmlns="" xmlns:p16="http://schemas.microsoft.com/office/powerpoint/2015/main" val="1"/>
+                <p16:designElem xmlns:p16="http://schemas.microsoft.com/office/powerpoint/2015/main" xmlns="" val="1"/>
               </p:ext>
             </p:extLst>
           </p:nvPr>
@@ -9705,7 +9696,7 @@
           <p:cNvPr id="27" name="Freeform 11">
             <a:extLst>
               <a:ext uri="{FF2B5EF4-FFF2-40B4-BE49-F238E27FC236}">
-                <a16:creationId xmlns="" xmlns:a16="http://schemas.microsoft.com/office/drawing/2014/main" id="{FBE3B62F-5853-4A3C-B050-6186351A7176}"/>
+                <a16:creationId xmlns:a16="http://schemas.microsoft.com/office/drawing/2014/main" xmlns="" id="{FBE3B62F-5853-4A3C-B050-6186351A7176}"/>
               </a:ext>
             </a:extLst>
           </p:cNvPr>
@@ -9715,7 +9706,7 @@
           <p:nvPr>
             <p:extLst>
               <p:ext uri="{386F3935-93C4-4BCD-93E2-E3B085C9AB24}">
-                <p16:designElem xmlns="" xmlns:p16="http://schemas.microsoft.com/office/powerpoint/2015/main" val="1"/>
+                <p16:designElem xmlns:p16="http://schemas.microsoft.com/office/powerpoint/2015/main" xmlns="" val="1"/>
               </p:ext>
             </p:extLst>
           </p:nvPr>
@@ -9841,7 +9832,7 @@
           <p:cNvPr id="2" name="Title 1">
             <a:extLst>
               <a:ext uri="{FF2B5EF4-FFF2-40B4-BE49-F238E27FC236}">
-                <a16:creationId xmlns="" xmlns:a16="http://schemas.microsoft.com/office/drawing/2014/main" id="{A5F6196D-B07E-499E-92C0-6953CE9F25D4}"/>
+                <a16:creationId xmlns:a16="http://schemas.microsoft.com/office/drawing/2014/main" xmlns="" id="{A5F6196D-B07E-499E-92C0-6953CE9F25D4}"/>
               </a:ext>
             </a:extLst>
           </p:cNvPr>
@@ -9880,7 +9871,7 @@
               <p:cNvPr id="17" name="Content Placeholder 16">
                 <a:extLst>
                   <a:ext uri="{FF2B5EF4-FFF2-40B4-BE49-F238E27FC236}">
-                    <a16:creationId xmlns="" xmlns:a16="http://schemas.microsoft.com/office/drawing/2014/main" id="{5FDBA27F-9676-4EE6-B75A-C35B42A0CD81}"/>
+                    <a16:creationId xmlns:a16="http://schemas.microsoft.com/office/drawing/2014/main" xmlns="" id="{5FDBA27F-9676-4EE6-B75A-C35B42A0CD81}"/>
                   </a:ext>
                 </a:extLst>
               </p:cNvPr>
@@ -9998,7 +9989,7 @@
           <p:cNvPr id="15" name="Content Placeholder 16">
             <a:extLst>
               <a:ext uri="{FF2B5EF4-FFF2-40B4-BE49-F238E27FC236}">
-                <a16:creationId xmlns="" xmlns:a16="http://schemas.microsoft.com/office/drawing/2014/main" id="{5FDBA27F-9676-4EE6-B75A-C35B42A0CD81}"/>
+                <a16:creationId xmlns:a16="http://schemas.microsoft.com/office/drawing/2014/main" xmlns="" id="{5FDBA27F-9676-4EE6-B75A-C35B42A0CD81}"/>
               </a:ext>
             </a:extLst>
           </p:cNvPr>
@@ -10194,7 +10185,7 @@
           <p:cNvPr id="18" name="Content Placeholder 16">
             <a:extLst>
               <a:ext uri="{FF2B5EF4-FFF2-40B4-BE49-F238E27FC236}">
-                <a16:creationId xmlns="" xmlns:a16="http://schemas.microsoft.com/office/drawing/2014/main" id="{5FDBA27F-9676-4EE6-B75A-C35B42A0CD81}"/>
+                <a16:creationId xmlns:a16="http://schemas.microsoft.com/office/drawing/2014/main" xmlns="" id="{5FDBA27F-9676-4EE6-B75A-C35B42A0CD81}"/>
               </a:ext>
             </a:extLst>
           </p:cNvPr>
@@ -10498,7 +10489,7 @@
           <p:cNvPr id="23" name="Rectangle 22">
             <a:extLst>
               <a:ext uri="{FF2B5EF4-FFF2-40B4-BE49-F238E27FC236}">
-                <a16:creationId xmlns="" xmlns:a16="http://schemas.microsoft.com/office/drawing/2014/main" id="{EE1FC7B4-E4A7-4452-B413-1A623E3A7230}"/>
+                <a16:creationId xmlns:a16="http://schemas.microsoft.com/office/drawing/2014/main" xmlns="" id="{EE1FC7B4-E4A7-4452-B413-1A623E3A7230}"/>
               </a:ext>
             </a:extLst>
           </p:cNvPr>
@@ -10508,7 +10499,7 @@
           <p:nvPr>
             <p:extLst>
               <p:ext uri="{386F3935-93C4-4BCD-93E2-E3B085C9AB24}">
-                <p16:designElem xmlns="" xmlns:p16="http://schemas.microsoft.com/office/powerpoint/2015/main" val="1"/>
+                <p16:designElem xmlns:p16="http://schemas.microsoft.com/office/powerpoint/2015/main" xmlns="" val="1"/>
               </p:ext>
             </p:extLst>
           </p:nvPr>
@@ -10589,7 +10580,7 @@
           <p:cNvPr id="25" name="Freeform 13">
             <a:extLst>
               <a:ext uri="{FF2B5EF4-FFF2-40B4-BE49-F238E27FC236}">
-                <a16:creationId xmlns="" xmlns:a16="http://schemas.microsoft.com/office/drawing/2014/main" id="{E0709AF0-24F0-4486-B189-BE6386BDB198}"/>
+                <a16:creationId xmlns:a16="http://schemas.microsoft.com/office/drawing/2014/main" xmlns="" id="{E0709AF0-24F0-4486-B189-BE6386BDB198}"/>
               </a:ext>
             </a:extLst>
           </p:cNvPr>
@@ -10599,7 +10590,7 @@
           <p:nvPr>
             <p:extLst>
               <p:ext uri="{386F3935-93C4-4BCD-93E2-E3B085C9AB24}">
-                <p16:designElem xmlns="" xmlns:p16="http://schemas.microsoft.com/office/powerpoint/2015/main" val="1"/>
+                <p16:designElem xmlns:p16="http://schemas.microsoft.com/office/powerpoint/2015/main" xmlns="" val="1"/>
               </p:ext>
             </p:extLst>
           </p:nvPr>
@@ -10723,7 +10714,7 @@
           <p:cNvPr id="27" name="Freeform 11">
             <a:extLst>
               <a:ext uri="{FF2B5EF4-FFF2-40B4-BE49-F238E27FC236}">
-                <a16:creationId xmlns="" xmlns:a16="http://schemas.microsoft.com/office/drawing/2014/main" id="{FBE3B62F-5853-4A3C-B050-6186351A7176}"/>
+                <a16:creationId xmlns:a16="http://schemas.microsoft.com/office/drawing/2014/main" xmlns="" id="{FBE3B62F-5853-4A3C-B050-6186351A7176}"/>
               </a:ext>
             </a:extLst>
           </p:cNvPr>
@@ -10733,7 +10724,7 @@
           <p:nvPr>
             <p:extLst>
               <p:ext uri="{386F3935-93C4-4BCD-93E2-E3B085C9AB24}">
-                <p16:designElem xmlns="" xmlns:p16="http://schemas.microsoft.com/office/powerpoint/2015/main" val="1"/>
+                <p16:designElem xmlns:p16="http://schemas.microsoft.com/office/powerpoint/2015/main" xmlns="" val="1"/>
               </p:ext>
             </p:extLst>
           </p:nvPr>
@@ -10859,7 +10850,7 @@
           <p:cNvPr id="2" name="Title 1">
             <a:extLst>
               <a:ext uri="{FF2B5EF4-FFF2-40B4-BE49-F238E27FC236}">
-                <a16:creationId xmlns="" xmlns:a16="http://schemas.microsoft.com/office/drawing/2014/main" id="{A5F6196D-B07E-499E-92C0-6953CE9F25D4}"/>
+                <a16:creationId xmlns:a16="http://schemas.microsoft.com/office/drawing/2014/main" xmlns="" id="{A5F6196D-B07E-499E-92C0-6953CE9F25D4}"/>
               </a:ext>
             </a:extLst>
           </p:cNvPr>
@@ -10898,7 +10889,7 @@
               <p:cNvPr id="17" name="Content Placeholder 16">
                 <a:extLst>
                   <a:ext uri="{FF2B5EF4-FFF2-40B4-BE49-F238E27FC236}">
-                    <a16:creationId xmlns="" xmlns:a16="http://schemas.microsoft.com/office/drawing/2014/main" id="{5FDBA27F-9676-4EE6-B75A-C35B42A0CD81}"/>
+                    <a16:creationId xmlns:a16="http://schemas.microsoft.com/office/drawing/2014/main" xmlns="" id="{5FDBA27F-9676-4EE6-B75A-C35B42A0CD81}"/>
                   </a:ext>
                 </a:extLst>
               </p:cNvPr>
@@ -11016,7 +11007,7 @@
           <p:cNvPr id="15" name="Content Placeholder 16">
             <a:extLst>
               <a:ext uri="{FF2B5EF4-FFF2-40B4-BE49-F238E27FC236}">
-                <a16:creationId xmlns="" xmlns:a16="http://schemas.microsoft.com/office/drawing/2014/main" id="{5FDBA27F-9676-4EE6-B75A-C35B42A0CD81}"/>
+                <a16:creationId xmlns:a16="http://schemas.microsoft.com/office/drawing/2014/main" xmlns="" id="{5FDBA27F-9676-4EE6-B75A-C35B42A0CD81}"/>
               </a:ext>
             </a:extLst>
           </p:cNvPr>
@@ -11212,7 +11203,7 @@
           <p:cNvPr id="18" name="Content Placeholder 16">
             <a:extLst>
               <a:ext uri="{FF2B5EF4-FFF2-40B4-BE49-F238E27FC236}">
-                <a16:creationId xmlns="" xmlns:a16="http://schemas.microsoft.com/office/drawing/2014/main" id="{5FDBA27F-9676-4EE6-B75A-C35B42A0CD81}"/>
+                <a16:creationId xmlns:a16="http://schemas.microsoft.com/office/drawing/2014/main" xmlns="" id="{5FDBA27F-9676-4EE6-B75A-C35B42A0CD81}"/>
               </a:ext>
             </a:extLst>
           </p:cNvPr>
@@ -11621,7 +11612,7 @@
           <p:cNvPr id="23" name="Rectangle 22">
             <a:extLst>
               <a:ext uri="{FF2B5EF4-FFF2-40B4-BE49-F238E27FC236}">
-                <a16:creationId xmlns="" xmlns:a16="http://schemas.microsoft.com/office/drawing/2014/main" id="{EE1FC7B4-E4A7-4452-B413-1A623E3A7230}"/>
+                <a16:creationId xmlns:a16="http://schemas.microsoft.com/office/drawing/2014/main" xmlns="" id="{EE1FC7B4-E4A7-4452-B413-1A623E3A7230}"/>
               </a:ext>
             </a:extLst>
           </p:cNvPr>
@@ -11631,7 +11622,7 @@
           <p:nvPr>
             <p:extLst>
               <p:ext uri="{386F3935-93C4-4BCD-93E2-E3B085C9AB24}">
-                <p16:designElem xmlns="" xmlns:p16="http://schemas.microsoft.com/office/powerpoint/2015/main" val="1"/>
+                <p16:designElem xmlns:p16="http://schemas.microsoft.com/office/powerpoint/2015/main" xmlns="" val="1"/>
               </p:ext>
             </p:extLst>
           </p:nvPr>
@@ -11712,7 +11703,7 @@
           <p:cNvPr id="25" name="Freeform 13">
             <a:extLst>
               <a:ext uri="{FF2B5EF4-FFF2-40B4-BE49-F238E27FC236}">
-                <a16:creationId xmlns="" xmlns:a16="http://schemas.microsoft.com/office/drawing/2014/main" id="{E0709AF0-24F0-4486-B189-BE6386BDB198}"/>
+                <a16:creationId xmlns:a16="http://schemas.microsoft.com/office/drawing/2014/main" xmlns="" id="{E0709AF0-24F0-4486-B189-BE6386BDB198}"/>
               </a:ext>
             </a:extLst>
           </p:cNvPr>
@@ -11722,7 +11713,7 @@
           <p:nvPr>
             <p:extLst>
               <p:ext uri="{386F3935-93C4-4BCD-93E2-E3B085C9AB24}">
-                <p16:designElem xmlns="" xmlns:p16="http://schemas.microsoft.com/office/powerpoint/2015/main" val="1"/>
+                <p16:designElem xmlns:p16="http://schemas.microsoft.com/office/powerpoint/2015/main" xmlns="" val="1"/>
               </p:ext>
             </p:extLst>
           </p:nvPr>
@@ -11846,7 +11837,7 @@
           <p:cNvPr id="27" name="Freeform 11">
             <a:extLst>
               <a:ext uri="{FF2B5EF4-FFF2-40B4-BE49-F238E27FC236}">
-                <a16:creationId xmlns="" xmlns:a16="http://schemas.microsoft.com/office/drawing/2014/main" id="{FBE3B62F-5853-4A3C-B050-6186351A7176}"/>
+                <a16:creationId xmlns:a16="http://schemas.microsoft.com/office/drawing/2014/main" xmlns="" id="{FBE3B62F-5853-4A3C-B050-6186351A7176}"/>
               </a:ext>
             </a:extLst>
           </p:cNvPr>
@@ -11856,7 +11847,7 @@
           <p:nvPr>
             <p:extLst>
               <p:ext uri="{386F3935-93C4-4BCD-93E2-E3B085C9AB24}">
-                <p16:designElem xmlns="" xmlns:p16="http://schemas.microsoft.com/office/powerpoint/2015/main" val="1"/>
+                <p16:designElem xmlns:p16="http://schemas.microsoft.com/office/powerpoint/2015/main" xmlns="" val="1"/>
               </p:ext>
             </p:extLst>
           </p:nvPr>
@@ -11982,7 +11973,7 @@
           <p:cNvPr id="2" name="Title 1">
             <a:extLst>
               <a:ext uri="{FF2B5EF4-FFF2-40B4-BE49-F238E27FC236}">
-                <a16:creationId xmlns="" xmlns:a16="http://schemas.microsoft.com/office/drawing/2014/main" id="{A5F6196D-B07E-499E-92C0-6953CE9F25D4}"/>
+                <a16:creationId xmlns:a16="http://schemas.microsoft.com/office/drawing/2014/main" xmlns="" id="{A5F6196D-B07E-499E-92C0-6953CE9F25D4}"/>
               </a:ext>
             </a:extLst>
           </p:cNvPr>
@@ -12021,7 +12012,7 @@
               <p:cNvPr id="17" name="Content Placeholder 16">
                 <a:extLst>
                   <a:ext uri="{FF2B5EF4-FFF2-40B4-BE49-F238E27FC236}">
-                    <a16:creationId xmlns="" xmlns:a16="http://schemas.microsoft.com/office/drawing/2014/main" id="{5FDBA27F-9676-4EE6-B75A-C35B42A0CD81}"/>
+                    <a16:creationId xmlns:a16="http://schemas.microsoft.com/office/drawing/2014/main" xmlns="" id="{5FDBA27F-9676-4EE6-B75A-C35B42A0CD81}"/>
                   </a:ext>
                 </a:extLst>
               </p:cNvPr>
@@ -12139,7 +12130,7 @@
           <p:cNvPr id="15" name="Content Placeholder 16">
             <a:extLst>
               <a:ext uri="{FF2B5EF4-FFF2-40B4-BE49-F238E27FC236}">
-                <a16:creationId xmlns="" xmlns:a16="http://schemas.microsoft.com/office/drawing/2014/main" id="{5FDBA27F-9676-4EE6-B75A-C35B42A0CD81}"/>
+                <a16:creationId xmlns:a16="http://schemas.microsoft.com/office/drawing/2014/main" xmlns="" id="{5FDBA27F-9676-4EE6-B75A-C35B42A0CD81}"/>
               </a:ext>
             </a:extLst>
           </p:cNvPr>
@@ -12335,7 +12326,7 @@
           <p:cNvPr id="18" name="Content Placeholder 16">
             <a:extLst>
               <a:ext uri="{FF2B5EF4-FFF2-40B4-BE49-F238E27FC236}">
-                <a16:creationId xmlns="" xmlns:a16="http://schemas.microsoft.com/office/drawing/2014/main" id="{5FDBA27F-9676-4EE6-B75A-C35B42A0CD81}"/>
+                <a16:creationId xmlns:a16="http://schemas.microsoft.com/office/drawing/2014/main" xmlns="" id="{5FDBA27F-9676-4EE6-B75A-C35B42A0CD81}"/>
               </a:ext>
             </a:extLst>
           </p:cNvPr>
@@ -13118,7 +13109,7 @@
           <p:cNvPr id="23" name="Rectangle 22">
             <a:extLst>
               <a:ext uri="{FF2B5EF4-FFF2-40B4-BE49-F238E27FC236}">
-                <a16:creationId xmlns="" xmlns:a16="http://schemas.microsoft.com/office/drawing/2014/main" id="{EE1FC7B4-E4A7-4452-B413-1A623E3A7230}"/>
+                <a16:creationId xmlns:a16="http://schemas.microsoft.com/office/drawing/2014/main" xmlns="" id="{EE1FC7B4-E4A7-4452-B413-1A623E3A7230}"/>
               </a:ext>
             </a:extLst>
           </p:cNvPr>
@@ -13128,7 +13119,7 @@
           <p:nvPr>
             <p:extLst>
               <p:ext uri="{386F3935-93C4-4BCD-93E2-E3B085C9AB24}">
-                <p16:designElem xmlns="" xmlns:p16="http://schemas.microsoft.com/office/powerpoint/2015/main" val="1"/>
+                <p16:designElem xmlns:p16="http://schemas.microsoft.com/office/powerpoint/2015/main" xmlns="" val="1"/>
               </p:ext>
             </p:extLst>
           </p:nvPr>
@@ -13209,7 +13200,7 @@
           <p:cNvPr id="25" name="Freeform 13">
             <a:extLst>
               <a:ext uri="{FF2B5EF4-FFF2-40B4-BE49-F238E27FC236}">
-                <a16:creationId xmlns="" xmlns:a16="http://schemas.microsoft.com/office/drawing/2014/main" id="{E0709AF0-24F0-4486-B189-BE6386BDB198}"/>
+                <a16:creationId xmlns:a16="http://schemas.microsoft.com/office/drawing/2014/main" xmlns="" id="{E0709AF0-24F0-4486-B189-BE6386BDB198}"/>
               </a:ext>
             </a:extLst>
           </p:cNvPr>
@@ -13219,7 +13210,7 @@
           <p:nvPr>
             <p:extLst>
               <p:ext uri="{386F3935-93C4-4BCD-93E2-E3B085C9AB24}">
-                <p16:designElem xmlns="" xmlns:p16="http://schemas.microsoft.com/office/powerpoint/2015/main" val="1"/>
+                <p16:designElem xmlns:p16="http://schemas.microsoft.com/office/powerpoint/2015/main" xmlns="" val="1"/>
               </p:ext>
             </p:extLst>
           </p:nvPr>
@@ -13343,7 +13334,7 @@
           <p:cNvPr id="27" name="Freeform 11">
             <a:extLst>
               <a:ext uri="{FF2B5EF4-FFF2-40B4-BE49-F238E27FC236}">
-                <a16:creationId xmlns="" xmlns:a16="http://schemas.microsoft.com/office/drawing/2014/main" id="{FBE3B62F-5853-4A3C-B050-6186351A7176}"/>
+                <a16:creationId xmlns:a16="http://schemas.microsoft.com/office/drawing/2014/main" xmlns="" id="{FBE3B62F-5853-4A3C-B050-6186351A7176}"/>
               </a:ext>
             </a:extLst>
           </p:cNvPr>
@@ -13353,7 +13344,7 @@
           <p:nvPr>
             <p:extLst>
               <p:ext uri="{386F3935-93C4-4BCD-93E2-E3B085C9AB24}">
-                <p16:designElem xmlns="" xmlns:p16="http://schemas.microsoft.com/office/powerpoint/2015/main" val="1"/>
+                <p16:designElem xmlns:p16="http://schemas.microsoft.com/office/powerpoint/2015/main" xmlns="" val="1"/>
               </p:ext>
             </p:extLst>
           </p:nvPr>
@@ -13479,7 +13470,7 @@
           <p:cNvPr id="2" name="Title 1">
             <a:extLst>
               <a:ext uri="{FF2B5EF4-FFF2-40B4-BE49-F238E27FC236}">
-                <a16:creationId xmlns="" xmlns:a16="http://schemas.microsoft.com/office/drawing/2014/main" id="{A5F6196D-B07E-499E-92C0-6953CE9F25D4}"/>
+                <a16:creationId xmlns:a16="http://schemas.microsoft.com/office/drawing/2014/main" xmlns="" id="{A5F6196D-B07E-499E-92C0-6953CE9F25D4}"/>
               </a:ext>
             </a:extLst>
           </p:cNvPr>
@@ -13516,7 +13507,7 @@
           <p:cNvPr id="15" name="Content Placeholder 16">
             <a:extLst>
               <a:ext uri="{FF2B5EF4-FFF2-40B4-BE49-F238E27FC236}">
-                <a16:creationId xmlns="" xmlns:a16="http://schemas.microsoft.com/office/drawing/2014/main" id="{5FDBA27F-9676-4EE6-B75A-C35B42A0CD81}"/>
+                <a16:creationId xmlns:a16="http://schemas.microsoft.com/office/drawing/2014/main" xmlns="" id="{5FDBA27F-9676-4EE6-B75A-C35B42A0CD81}"/>
               </a:ext>
             </a:extLst>
           </p:cNvPr>
@@ -13712,7 +13703,7 @@
           <p:cNvPr id="18" name="Content Placeholder 16">
             <a:extLst>
               <a:ext uri="{FF2B5EF4-FFF2-40B4-BE49-F238E27FC236}">
-                <a16:creationId xmlns="" xmlns:a16="http://schemas.microsoft.com/office/drawing/2014/main" id="{5FDBA27F-9676-4EE6-B75A-C35B42A0CD81}"/>
+                <a16:creationId xmlns:a16="http://schemas.microsoft.com/office/drawing/2014/main" xmlns="" id="{5FDBA27F-9676-4EE6-B75A-C35B42A0CD81}"/>
               </a:ext>
             </a:extLst>
           </p:cNvPr>
@@ -13983,7 +13974,7 @@
           <p:cNvPr id="39" name="Freeform: Shape 38">
             <a:extLst>
               <a:ext uri="{FF2B5EF4-FFF2-40B4-BE49-F238E27FC236}">
-                <a16:creationId xmlns="" xmlns:a16="http://schemas.microsoft.com/office/drawing/2014/main" id="{64965EAE-E41A-435F-B993-07E824B6C977}"/>
+                <a16:creationId xmlns:a16="http://schemas.microsoft.com/office/drawing/2014/main" xmlns="" id="{64965EAE-E41A-435F-B993-07E824B6C977}"/>
               </a:ext>
             </a:extLst>
           </p:cNvPr>
@@ -13993,7 +13984,7 @@
           <p:nvPr>
             <p:extLst>
               <p:ext uri="{386F3935-93C4-4BCD-93E2-E3B085C9AB24}">
-                <p16:designElem xmlns="" xmlns:p16="http://schemas.microsoft.com/office/powerpoint/2015/main" val="1"/>
+                <p16:designElem xmlns:p16="http://schemas.microsoft.com/office/powerpoint/2015/main" xmlns="" val="1"/>
               </p:ext>
             </p:extLst>
           </p:nvPr>
@@ -14092,7 +14083,7 @@
           <p:cNvPr id="41" name="Freeform: Shape 40">
             <a:extLst>
               <a:ext uri="{FF2B5EF4-FFF2-40B4-BE49-F238E27FC236}">
-                <a16:creationId xmlns="" xmlns:a16="http://schemas.microsoft.com/office/drawing/2014/main" id="{152F8994-E6D4-4311-9548-C3607BC43645}"/>
+                <a16:creationId xmlns:a16="http://schemas.microsoft.com/office/drawing/2014/main" xmlns="" id="{152F8994-E6D4-4311-9548-C3607BC43645}"/>
               </a:ext>
             </a:extLst>
           </p:cNvPr>
@@ -14102,7 +14093,7 @@
           <p:nvPr>
             <p:extLst>
               <p:ext uri="{386F3935-93C4-4BCD-93E2-E3B085C9AB24}">
-                <p16:designElem xmlns="" xmlns:p16="http://schemas.microsoft.com/office/powerpoint/2015/main" val="1"/>
+                <p16:designElem xmlns:p16="http://schemas.microsoft.com/office/powerpoint/2015/main" xmlns="" val="1"/>
               </p:ext>
             </p:extLst>
           </p:nvPr>
@@ -14200,7 +14191,7 @@
           <p:cNvPr id="2" name="Title 1">
             <a:extLst>
               <a:ext uri="{FF2B5EF4-FFF2-40B4-BE49-F238E27FC236}">
-                <a16:creationId xmlns="" xmlns:a16="http://schemas.microsoft.com/office/drawing/2014/main" id="{A5F6196D-B07E-499E-92C0-6953CE9F25D4}"/>
+                <a16:creationId xmlns:a16="http://schemas.microsoft.com/office/drawing/2014/main" xmlns="" id="{A5F6196D-B07E-499E-92C0-6953CE9F25D4}"/>
               </a:ext>
             </a:extLst>
           </p:cNvPr>
@@ -14244,7 +14235,7 @@
           <p:cNvPr id="17" name="Content Placeholder 16">
             <a:extLst>
               <a:ext uri="{FF2B5EF4-FFF2-40B4-BE49-F238E27FC236}">
-                <a16:creationId xmlns="" xmlns:a16="http://schemas.microsoft.com/office/drawing/2014/main" id="{5FDBA27F-9676-4EE6-B75A-C35B42A0CD81}"/>
+                <a16:creationId xmlns:a16="http://schemas.microsoft.com/office/drawing/2014/main" xmlns="" id="{5FDBA27F-9676-4EE6-B75A-C35B42A0CD81}"/>
               </a:ext>
             </a:extLst>
           </p:cNvPr>
@@ -14473,7 +14464,7 @@
           <p:cNvPr id="16" name="Title 1">
             <a:extLst>
               <a:ext uri="{FF2B5EF4-FFF2-40B4-BE49-F238E27FC236}">
-                <a16:creationId xmlns="" xmlns:a16="http://schemas.microsoft.com/office/drawing/2014/main" id="{A5F6196D-B07E-499E-92C0-6953CE9F25D4}"/>
+                <a16:creationId xmlns:a16="http://schemas.microsoft.com/office/drawing/2014/main" xmlns="" id="{A5F6196D-B07E-499E-92C0-6953CE9F25D4}"/>
               </a:ext>
             </a:extLst>
           </p:cNvPr>
@@ -14536,7 +14527,7 @@
           <p:cNvPr id="18" name="Content Placeholder 16">
             <a:extLst>
               <a:ext uri="{FF2B5EF4-FFF2-40B4-BE49-F238E27FC236}">
-                <a16:creationId xmlns="" xmlns:a16="http://schemas.microsoft.com/office/drawing/2014/main" id="{5FDBA27F-9676-4EE6-B75A-C35B42A0CD81}"/>
+                <a16:creationId xmlns:a16="http://schemas.microsoft.com/office/drawing/2014/main" xmlns="" id="{5FDBA27F-9676-4EE6-B75A-C35B42A0CD81}"/>
               </a:ext>
             </a:extLst>
           </p:cNvPr>
@@ -14801,7 +14792,7 @@
           <p:cNvPr id="23" name="Rectangle 22">
             <a:extLst>
               <a:ext uri="{FF2B5EF4-FFF2-40B4-BE49-F238E27FC236}">
-                <a16:creationId xmlns="" xmlns:a16="http://schemas.microsoft.com/office/drawing/2014/main" id="{EE1FC7B4-E4A7-4452-B413-1A623E3A7230}"/>
+                <a16:creationId xmlns:a16="http://schemas.microsoft.com/office/drawing/2014/main" xmlns="" id="{EE1FC7B4-E4A7-4452-B413-1A623E3A7230}"/>
               </a:ext>
             </a:extLst>
           </p:cNvPr>
@@ -14811,7 +14802,7 @@
           <p:nvPr>
             <p:extLst>
               <p:ext uri="{386F3935-93C4-4BCD-93E2-E3B085C9AB24}">
-                <p16:designElem xmlns="" xmlns:p16="http://schemas.microsoft.com/office/powerpoint/2015/main" val="1"/>
+                <p16:designElem xmlns:p16="http://schemas.microsoft.com/office/powerpoint/2015/main" xmlns="" val="1"/>
               </p:ext>
             </p:extLst>
           </p:nvPr>
@@ -14892,7 +14883,7 @@
           <p:cNvPr id="25" name="Freeform 13">
             <a:extLst>
               <a:ext uri="{FF2B5EF4-FFF2-40B4-BE49-F238E27FC236}">
-                <a16:creationId xmlns="" xmlns:a16="http://schemas.microsoft.com/office/drawing/2014/main" id="{E0709AF0-24F0-4486-B189-BE6386BDB198}"/>
+                <a16:creationId xmlns:a16="http://schemas.microsoft.com/office/drawing/2014/main" xmlns="" id="{E0709AF0-24F0-4486-B189-BE6386BDB198}"/>
               </a:ext>
             </a:extLst>
           </p:cNvPr>
@@ -14902,7 +14893,7 @@
           <p:nvPr>
             <p:extLst>
               <p:ext uri="{386F3935-93C4-4BCD-93E2-E3B085C9AB24}">
-                <p16:designElem xmlns="" xmlns:p16="http://schemas.microsoft.com/office/powerpoint/2015/main" val="1"/>
+                <p16:designElem xmlns:p16="http://schemas.microsoft.com/office/powerpoint/2015/main" xmlns="" val="1"/>
               </p:ext>
             </p:extLst>
           </p:nvPr>
@@ -15026,7 +15017,7 @@
           <p:cNvPr id="27" name="Freeform 11">
             <a:extLst>
               <a:ext uri="{FF2B5EF4-FFF2-40B4-BE49-F238E27FC236}">
-                <a16:creationId xmlns="" xmlns:a16="http://schemas.microsoft.com/office/drawing/2014/main" id="{FBE3B62F-5853-4A3C-B050-6186351A7176}"/>
+                <a16:creationId xmlns:a16="http://schemas.microsoft.com/office/drawing/2014/main" xmlns="" id="{FBE3B62F-5853-4A3C-B050-6186351A7176}"/>
               </a:ext>
             </a:extLst>
           </p:cNvPr>
@@ -15036,7 +15027,7 @@
           <p:nvPr>
             <p:extLst>
               <p:ext uri="{386F3935-93C4-4BCD-93E2-E3B085C9AB24}">
-                <p16:designElem xmlns="" xmlns:p16="http://schemas.microsoft.com/office/powerpoint/2015/main" val="1"/>
+                <p16:designElem xmlns:p16="http://schemas.microsoft.com/office/powerpoint/2015/main" xmlns="" val="1"/>
               </p:ext>
             </p:extLst>
           </p:nvPr>
@@ -15162,7 +15153,7 @@
           <p:cNvPr id="15" name="Title 1">
             <a:extLst>
               <a:ext uri="{FF2B5EF4-FFF2-40B4-BE49-F238E27FC236}">
-                <a16:creationId xmlns="" xmlns:a16="http://schemas.microsoft.com/office/drawing/2014/main" id="{48EC109C-56A4-422C-9F35-8567F8D624CE}"/>
+                <a16:creationId xmlns:a16="http://schemas.microsoft.com/office/drawing/2014/main" xmlns="" id="{48EC109C-56A4-422C-9F35-8567F8D624CE}"/>
               </a:ext>
             </a:extLst>
           </p:cNvPr>
@@ -15246,7 +15237,7 @@
           <p:cNvPr id="16" name="Picture 15">
             <a:extLst>
               <a:ext uri="{FF2B5EF4-FFF2-40B4-BE49-F238E27FC236}">
-                <a16:creationId xmlns="" xmlns:a16="http://schemas.microsoft.com/office/drawing/2014/main" id="{F6726E6B-363C-4E50-8446-79407E2AEB25}"/>
+                <a16:creationId xmlns:a16="http://schemas.microsoft.com/office/drawing/2014/main" xmlns="" id="{F6726E6B-363C-4E50-8446-79407E2AEB25}"/>
               </a:ext>
             </a:extLst>
           </p:cNvPr>
@@ -15282,7 +15273,7 @@
           <p:cNvPr id="19" name="TextBox 18">
             <a:extLst>
               <a:ext uri="{FF2B5EF4-FFF2-40B4-BE49-F238E27FC236}">
-                <a16:creationId xmlns="" xmlns:a16="http://schemas.microsoft.com/office/drawing/2014/main" id="{0853C66F-B064-4E12-9E48-5D11B374C147}"/>
+                <a16:creationId xmlns:a16="http://schemas.microsoft.com/office/drawing/2014/main" xmlns="" id="{0853C66F-B064-4E12-9E48-5D11B374C147}"/>
               </a:ext>
             </a:extLst>
           </p:cNvPr>
@@ -15347,7 +15338,7 @@
           <p:cNvPr id="7" name="Rectangle 6">
             <a:extLst>
               <a:ext uri="{FF2B5EF4-FFF2-40B4-BE49-F238E27FC236}">
-                <a16:creationId xmlns="" xmlns:a16="http://schemas.microsoft.com/office/drawing/2014/main" id="{7605F2D1-1EC6-46B5-9601-DA1C25DA0B7A}"/>
+                <a16:creationId xmlns:a16="http://schemas.microsoft.com/office/drawing/2014/main" xmlns="" id="{7605F2D1-1EC6-46B5-9601-DA1C25DA0B7A}"/>
               </a:ext>
             </a:extLst>
           </p:cNvPr>
@@ -15490,7 +15481,7 @@
           <p:cNvPr id="23" name="Rectangle 22">
             <a:extLst>
               <a:ext uri="{FF2B5EF4-FFF2-40B4-BE49-F238E27FC236}">
-                <a16:creationId xmlns="" xmlns:a16="http://schemas.microsoft.com/office/drawing/2014/main" id="{EE1FC7B4-E4A7-4452-B413-1A623E3A7230}"/>
+                <a16:creationId xmlns:a16="http://schemas.microsoft.com/office/drawing/2014/main" xmlns="" id="{EE1FC7B4-E4A7-4452-B413-1A623E3A7230}"/>
               </a:ext>
             </a:extLst>
           </p:cNvPr>
@@ -15500,7 +15491,7 @@
           <p:nvPr>
             <p:extLst>
               <p:ext uri="{386F3935-93C4-4BCD-93E2-E3B085C9AB24}">
-                <p16:designElem xmlns="" xmlns:p16="http://schemas.microsoft.com/office/powerpoint/2015/main" val="1"/>
+                <p16:designElem xmlns:p16="http://schemas.microsoft.com/office/powerpoint/2015/main" xmlns="" val="1"/>
               </p:ext>
             </p:extLst>
           </p:nvPr>
@@ -15581,7 +15572,7 @@
           <p:cNvPr id="25" name="Freeform 13">
             <a:extLst>
               <a:ext uri="{FF2B5EF4-FFF2-40B4-BE49-F238E27FC236}">
-                <a16:creationId xmlns="" xmlns:a16="http://schemas.microsoft.com/office/drawing/2014/main" id="{E0709AF0-24F0-4486-B189-BE6386BDB198}"/>
+                <a16:creationId xmlns:a16="http://schemas.microsoft.com/office/drawing/2014/main" xmlns="" id="{E0709AF0-24F0-4486-B189-BE6386BDB198}"/>
               </a:ext>
             </a:extLst>
           </p:cNvPr>
@@ -15591,7 +15582,7 @@
           <p:nvPr>
             <p:extLst>
               <p:ext uri="{386F3935-93C4-4BCD-93E2-E3B085C9AB24}">
-                <p16:designElem xmlns="" xmlns:p16="http://schemas.microsoft.com/office/powerpoint/2015/main" val="1"/>
+                <p16:designElem xmlns:p16="http://schemas.microsoft.com/office/powerpoint/2015/main" xmlns="" val="1"/>
               </p:ext>
             </p:extLst>
           </p:nvPr>
@@ -15715,7 +15706,7 @@
           <p:cNvPr id="27" name="Freeform 11">
             <a:extLst>
               <a:ext uri="{FF2B5EF4-FFF2-40B4-BE49-F238E27FC236}">
-                <a16:creationId xmlns="" xmlns:a16="http://schemas.microsoft.com/office/drawing/2014/main" id="{FBE3B62F-5853-4A3C-B050-6186351A7176}"/>
+                <a16:creationId xmlns:a16="http://schemas.microsoft.com/office/drawing/2014/main" xmlns="" id="{FBE3B62F-5853-4A3C-B050-6186351A7176}"/>
               </a:ext>
             </a:extLst>
           </p:cNvPr>
@@ -15725,7 +15716,7 @@
           <p:nvPr>
             <p:extLst>
               <p:ext uri="{386F3935-93C4-4BCD-93E2-E3B085C9AB24}">
-                <p16:designElem xmlns="" xmlns:p16="http://schemas.microsoft.com/office/powerpoint/2015/main" val="1"/>
+                <p16:designElem xmlns:p16="http://schemas.microsoft.com/office/powerpoint/2015/main" xmlns="" val="1"/>
               </p:ext>
             </p:extLst>
           </p:nvPr>
@@ -15851,7 +15842,7 @@
           <p:cNvPr id="2" name="Title 1">
             <a:extLst>
               <a:ext uri="{FF2B5EF4-FFF2-40B4-BE49-F238E27FC236}">
-                <a16:creationId xmlns="" xmlns:a16="http://schemas.microsoft.com/office/drawing/2014/main" id="{A5F6196D-B07E-499E-92C0-6953CE9F25D4}"/>
+                <a16:creationId xmlns:a16="http://schemas.microsoft.com/office/drawing/2014/main" xmlns="" id="{A5F6196D-B07E-499E-92C0-6953CE9F25D4}"/>
               </a:ext>
             </a:extLst>
           </p:cNvPr>
@@ -15888,7 +15879,7 @@
           <p:cNvPr id="18" name="Content Placeholder 16">
             <a:extLst>
               <a:ext uri="{FF2B5EF4-FFF2-40B4-BE49-F238E27FC236}">
-                <a16:creationId xmlns="" xmlns:a16="http://schemas.microsoft.com/office/drawing/2014/main" id="{5FDBA27F-9676-4EE6-B75A-C35B42A0CD81}"/>
+                <a16:creationId xmlns:a16="http://schemas.microsoft.com/office/drawing/2014/main" xmlns="" id="{5FDBA27F-9676-4EE6-B75A-C35B42A0CD81}"/>
               </a:ext>
             </a:extLst>
           </p:cNvPr>
@@ -16402,7 +16393,7 @@
           <p:cNvPr id="23" name="Rectangle 22">
             <a:extLst>
               <a:ext uri="{FF2B5EF4-FFF2-40B4-BE49-F238E27FC236}">
-                <a16:creationId xmlns="" xmlns:a16="http://schemas.microsoft.com/office/drawing/2014/main" id="{EE1FC7B4-E4A7-4452-B413-1A623E3A7230}"/>
+                <a16:creationId xmlns:a16="http://schemas.microsoft.com/office/drawing/2014/main" xmlns="" id="{EE1FC7B4-E4A7-4452-B413-1A623E3A7230}"/>
               </a:ext>
             </a:extLst>
           </p:cNvPr>
@@ -16412,7 +16403,7 @@
           <p:nvPr>
             <p:extLst>
               <p:ext uri="{386F3935-93C4-4BCD-93E2-E3B085C9AB24}">
-                <p16:designElem xmlns="" xmlns:p16="http://schemas.microsoft.com/office/powerpoint/2015/main" val="1"/>
+                <p16:designElem xmlns:p16="http://schemas.microsoft.com/office/powerpoint/2015/main" xmlns="" val="1"/>
               </p:ext>
             </p:extLst>
           </p:nvPr>
@@ -16493,7 +16484,7 @@
           <p:cNvPr id="25" name="Freeform 13">
             <a:extLst>
               <a:ext uri="{FF2B5EF4-FFF2-40B4-BE49-F238E27FC236}">
-                <a16:creationId xmlns="" xmlns:a16="http://schemas.microsoft.com/office/drawing/2014/main" id="{E0709AF0-24F0-4486-B189-BE6386BDB198}"/>
+                <a16:creationId xmlns:a16="http://schemas.microsoft.com/office/drawing/2014/main" xmlns="" id="{E0709AF0-24F0-4486-B189-BE6386BDB198}"/>
               </a:ext>
             </a:extLst>
           </p:cNvPr>
@@ -16503,7 +16494,7 @@
           <p:nvPr>
             <p:extLst>
               <p:ext uri="{386F3935-93C4-4BCD-93E2-E3B085C9AB24}">
-                <p16:designElem xmlns="" xmlns:p16="http://schemas.microsoft.com/office/powerpoint/2015/main" val="1"/>
+                <p16:designElem xmlns:p16="http://schemas.microsoft.com/office/powerpoint/2015/main" xmlns="" val="1"/>
               </p:ext>
             </p:extLst>
           </p:nvPr>
@@ -16627,7 +16618,7 @@
           <p:cNvPr id="27" name="Freeform 11">
             <a:extLst>
               <a:ext uri="{FF2B5EF4-FFF2-40B4-BE49-F238E27FC236}">
-                <a16:creationId xmlns="" xmlns:a16="http://schemas.microsoft.com/office/drawing/2014/main" id="{FBE3B62F-5853-4A3C-B050-6186351A7176}"/>
+                <a16:creationId xmlns:a16="http://schemas.microsoft.com/office/drawing/2014/main" xmlns="" id="{FBE3B62F-5853-4A3C-B050-6186351A7176}"/>
               </a:ext>
             </a:extLst>
           </p:cNvPr>
@@ -16637,7 +16628,7 @@
           <p:nvPr>
             <p:extLst>
               <p:ext uri="{386F3935-93C4-4BCD-93E2-E3B085C9AB24}">
-                <p16:designElem xmlns="" xmlns:p16="http://schemas.microsoft.com/office/powerpoint/2015/main" val="1"/>
+                <p16:designElem xmlns:p16="http://schemas.microsoft.com/office/powerpoint/2015/main" xmlns="" val="1"/>
               </p:ext>
             </p:extLst>
           </p:nvPr>
@@ -16763,7 +16754,7 @@
           <p:cNvPr id="2" name="Title 1">
             <a:extLst>
               <a:ext uri="{FF2B5EF4-FFF2-40B4-BE49-F238E27FC236}">
-                <a16:creationId xmlns="" xmlns:a16="http://schemas.microsoft.com/office/drawing/2014/main" id="{A5F6196D-B07E-499E-92C0-6953CE9F25D4}"/>
+                <a16:creationId xmlns:a16="http://schemas.microsoft.com/office/drawing/2014/main" xmlns="" id="{A5F6196D-B07E-499E-92C0-6953CE9F25D4}"/>
               </a:ext>
             </a:extLst>
           </p:cNvPr>
@@ -16800,7 +16791,7 @@
           <p:cNvPr id="15" name="Content Placeholder 16">
             <a:extLst>
               <a:ext uri="{FF2B5EF4-FFF2-40B4-BE49-F238E27FC236}">
-                <a16:creationId xmlns="" xmlns:a16="http://schemas.microsoft.com/office/drawing/2014/main" id="{5FDBA27F-9676-4EE6-B75A-C35B42A0CD81}"/>
+                <a16:creationId xmlns:a16="http://schemas.microsoft.com/office/drawing/2014/main" xmlns="" id="{5FDBA27F-9676-4EE6-B75A-C35B42A0CD81}"/>
               </a:ext>
             </a:extLst>
           </p:cNvPr>
@@ -16996,7 +16987,7 @@
           <p:cNvPr id="18" name="Content Placeholder 16">
             <a:extLst>
               <a:ext uri="{FF2B5EF4-FFF2-40B4-BE49-F238E27FC236}">
-                <a16:creationId xmlns="" xmlns:a16="http://schemas.microsoft.com/office/drawing/2014/main" id="{5FDBA27F-9676-4EE6-B75A-C35B42A0CD81}"/>
+                <a16:creationId xmlns:a16="http://schemas.microsoft.com/office/drawing/2014/main" xmlns="" id="{5FDBA27F-9676-4EE6-B75A-C35B42A0CD81}"/>
               </a:ext>
             </a:extLst>
           </p:cNvPr>
@@ -18315,7 +18306,7 @@
           <p:cNvPr id="23" name="Rectangle 22">
             <a:extLst>
               <a:ext uri="{FF2B5EF4-FFF2-40B4-BE49-F238E27FC236}">
-                <a16:creationId xmlns="" xmlns:a16="http://schemas.microsoft.com/office/drawing/2014/main" id="{EE1FC7B4-E4A7-4452-B413-1A623E3A7230}"/>
+                <a16:creationId xmlns:a16="http://schemas.microsoft.com/office/drawing/2014/main" xmlns="" id="{EE1FC7B4-E4A7-4452-B413-1A623E3A7230}"/>
               </a:ext>
             </a:extLst>
           </p:cNvPr>
@@ -18325,7 +18316,7 @@
           <p:nvPr>
             <p:extLst>
               <p:ext uri="{386F3935-93C4-4BCD-93E2-E3B085C9AB24}">
-                <p16:designElem xmlns="" xmlns:p16="http://schemas.microsoft.com/office/powerpoint/2015/main" val="1"/>
+                <p16:designElem xmlns:p16="http://schemas.microsoft.com/office/powerpoint/2015/main" xmlns="" val="1"/>
               </p:ext>
             </p:extLst>
           </p:nvPr>
@@ -18406,7 +18397,7 @@
           <p:cNvPr id="25" name="Freeform 13">
             <a:extLst>
               <a:ext uri="{FF2B5EF4-FFF2-40B4-BE49-F238E27FC236}">
-                <a16:creationId xmlns="" xmlns:a16="http://schemas.microsoft.com/office/drawing/2014/main" id="{E0709AF0-24F0-4486-B189-BE6386BDB198}"/>
+                <a16:creationId xmlns:a16="http://schemas.microsoft.com/office/drawing/2014/main" xmlns="" id="{E0709AF0-24F0-4486-B189-BE6386BDB198}"/>
               </a:ext>
             </a:extLst>
           </p:cNvPr>
@@ -18416,7 +18407,7 @@
           <p:nvPr>
             <p:extLst>
               <p:ext uri="{386F3935-93C4-4BCD-93E2-E3B085C9AB24}">
-                <p16:designElem xmlns="" xmlns:p16="http://schemas.microsoft.com/office/powerpoint/2015/main" val="1"/>
+                <p16:designElem xmlns:p16="http://schemas.microsoft.com/office/powerpoint/2015/main" xmlns="" val="1"/>
               </p:ext>
             </p:extLst>
           </p:nvPr>
@@ -18540,7 +18531,7 @@
           <p:cNvPr id="27" name="Freeform 11">
             <a:extLst>
               <a:ext uri="{FF2B5EF4-FFF2-40B4-BE49-F238E27FC236}">
-                <a16:creationId xmlns="" xmlns:a16="http://schemas.microsoft.com/office/drawing/2014/main" id="{FBE3B62F-5853-4A3C-B050-6186351A7176}"/>
+                <a16:creationId xmlns:a16="http://schemas.microsoft.com/office/drawing/2014/main" xmlns="" id="{FBE3B62F-5853-4A3C-B050-6186351A7176}"/>
               </a:ext>
             </a:extLst>
           </p:cNvPr>
@@ -18550,7 +18541,7 @@
           <p:nvPr>
             <p:extLst>
               <p:ext uri="{386F3935-93C4-4BCD-93E2-E3B085C9AB24}">
-                <p16:designElem xmlns="" xmlns:p16="http://schemas.microsoft.com/office/powerpoint/2015/main" val="1"/>
+                <p16:designElem xmlns:p16="http://schemas.microsoft.com/office/powerpoint/2015/main" xmlns="" val="1"/>
               </p:ext>
             </p:extLst>
           </p:nvPr>
@@ -18676,7 +18667,7 @@
           <p:cNvPr id="2" name="Title 1">
             <a:extLst>
               <a:ext uri="{FF2B5EF4-FFF2-40B4-BE49-F238E27FC236}">
-                <a16:creationId xmlns="" xmlns:a16="http://schemas.microsoft.com/office/drawing/2014/main" id="{A5F6196D-B07E-499E-92C0-6953CE9F25D4}"/>
+                <a16:creationId xmlns:a16="http://schemas.microsoft.com/office/drawing/2014/main" xmlns="" id="{A5F6196D-B07E-499E-92C0-6953CE9F25D4}"/>
               </a:ext>
             </a:extLst>
           </p:cNvPr>
@@ -18713,7 +18704,7 @@
           <p:cNvPr id="15" name="Content Placeholder 16">
             <a:extLst>
               <a:ext uri="{FF2B5EF4-FFF2-40B4-BE49-F238E27FC236}">
-                <a16:creationId xmlns="" xmlns:a16="http://schemas.microsoft.com/office/drawing/2014/main" id="{5FDBA27F-9676-4EE6-B75A-C35B42A0CD81}"/>
+                <a16:creationId xmlns:a16="http://schemas.microsoft.com/office/drawing/2014/main" xmlns="" id="{5FDBA27F-9676-4EE6-B75A-C35B42A0CD81}"/>
               </a:ext>
             </a:extLst>
           </p:cNvPr>
@@ -18909,7 +18900,7 @@
           <p:cNvPr id="18" name="Content Placeholder 16">
             <a:extLst>
               <a:ext uri="{FF2B5EF4-FFF2-40B4-BE49-F238E27FC236}">
-                <a16:creationId xmlns="" xmlns:a16="http://schemas.microsoft.com/office/drawing/2014/main" id="{5FDBA27F-9676-4EE6-B75A-C35B42A0CD81}"/>
+                <a16:creationId xmlns:a16="http://schemas.microsoft.com/office/drawing/2014/main" xmlns="" id="{5FDBA27F-9676-4EE6-B75A-C35B42A0CD81}"/>
               </a:ext>
             </a:extLst>
           </p:cNvPr>
@@ -20533,7 +20524,7 @@
           <p:cNvPr id="23" name="Rectangle 22">
             <a:extLst>
               <a:ext uri="{FF2B5EF4-FFF2-40B4-BE49-F238E27FC236}">
-                <a16:creationId xmlns="" xmlns:a16="http://schemas.microsoft.com/office/drawing/2014/main" id="{EE1FC7B4-E4A7-4452-B413-1A623E3A7230}"/>
+                <a16:creationId xmlns:a16="http://schemas.microsoft.com/office/drawing/2014/main" xmlns="" id="{EE1FC7B4-E4A7-4452-B413-1A623E3A7230}"/>
               </a:ext>
             </a:extLst>
           </p:cNvPr>
@@ -20543,7 +20534,7 @@
           <p:nvPr>
             <p:extLst>
               <p:ext uri="{386F3935-93C4-4BCD-93E2-E3B085C9AB24}">
-                <p16:designElem xmlns="" xmlns:p16="http://schemas.microsoft.com/office/powerpoint/2015/main" val="1"/>
+                <p16:designElem xmlns:p16="http://schemas.microsoft.com/office/powerpoint/2015/main" xmlns="" val="1"/>
               </p:ext>
             </p:extLst>
           </p:nvPr>
@@ -20624,7 +20615,7 @@
           <p:cNvPr id="25" name="Freeform 13">
             <a:extLst>
               <a:ext uri="{FF2B5EF4-FFF2-40B4-BE49-F238E27FC236}">
-                <a16:creationId xmlns="" xmlns:a16="http://schemas.microsoft.com/office/drawing/2014/main" id="{E0709AF0-24F0-4486-B189-BE6386BDB198}"/>
+                <a16:creationId xmlns:a16="http://schemas.microsoft.com/office/drawing/2014/main" xmlns="" id="{E0709AF0-24F0-4486-B189-BE6386BDB198}"/>
               </a:ext>
             </a:extLst>
           </p:cNvPr>
@@ -20634,7 +20625,7 @@
           <p:nvPr>
             <p:extLst>
               <p:ext uri="{386F3935-93C4-4BCD-93E2-E3B085C9AB24}">
-                <p16:designElem xmlns="" xmlns:p16="http://schemas.microsoft.com/office/powerpoint/2015/main" val="1"/>
+                <p16:designElem xmlns:p16="http://schemas.microsoft.com/office/powerpoint/2015/main" xmlns="" val="1"/>
               </p:ext>
             </p:extLst>
           </p:nvPr>
@@ -20758,7 +20749,7 @@
           <p:cNvPr id="27" name="Freeform 11">
             <a:extLst>
               <a:ext uri="{FF2B5EF4-FFF2-40B4-BE49-F238E27FC236}">
-                <a16:creationId xmlns="" xmlns:a16="http://schemas.microsoft.com/office/drawing/2014/main" id="{FBE3B62F-5853-4A3C-B050-6186351A7176}"/>
+                <a16:creationId xmlns:a16="http://schemas.microsoft.com/office/drawing/2014/main" xmlns="" id="{FBE3B62F-5853-4A3C-B050-6186351A7176}"/>
               </a:ext>
             </a:extLst>
           </p:cNvPr>
@@ -20768,7 +20759,7 @@
           <p:nvPr>
             <p:extLst>
               <p:ext uri="{386F3935-93C4-4BCD-93E2-E3B085C9AB24}">
-                <p16:designElem xmlns="" xmlns:p16="http://schemas.microsoft.com/office/powerpoint/2015/main" val="1"/>
+                <p16:designElem xmlns:p16="http://schemas.microsoft.com/office/powerpoint/2015/main" xmlns="" val="1"/>
               </p:ext>
             </p:extLst>
           </p:nvPr>
@@ -20894,7 +20885,7 @@
           <p:cNvPr id="2" name="Title 1">
             <a:extLst>
               <a:ext uri="{FF2B5EF4-FFF2-40B4-BE49-F238E27FC236}">
-                <a16:creationId xmlns="" xmlns:a16="http://schemas.microsoft.com/office/drawing/2014/main" id="{A5F6196D-B07E-499E-92C0-6953CE9F25D4}"/>
+                <a16:creationId xmlns:a16="http://schemas.microsoft.com/office/drawing/2014/main" xmlns="" id="{A5F6196D-B07E-499E-92C0-6953CE9F25D4}"/>
               </a:ext>
             </a:extLst>
           </p:cNvPr>
@@ -20931,7 +20922,7 @@
           <p:cNvPr id="15" name="Content Placeholder 16">
             <a:extLst>
               <a:ext uri="{FF2B5EF4-FFF2-40B4-BE49-F238E27FC236}">
-                <a16:creationId xmlns="" xmlns:a16="http://schemas.microsoft.com/office/drawing/2014/main" id="{5FDBA27F-9676-4EE6-B75A-C35B42A0CD81}"/>
+                <a16:creationId xmlns:a16="http://schemas.microsoft.com/office/drawing/2014/main" xmlns="" id="{5FDBA27F-9676-4EE6-B75A-C35B42A0CD81}"/>
               </a:ext>
             </a:extLst>
           </p:cNvPr>
@@ -21127,7 +21118,7 @@
           <p:cNvPr id="18" name="Content Placeholder 16">
             <a:extLst>
               <a:ext uri="{FF2B5EF4-FFF2-40B4-BE49-F238E27FC236}">
-                <a16:creationId xmlns="" xmlns:a16="http://schemas.microsoft.com/office/drawing/2014/main" id="{5FDBA27F-9676-4EE6-B75A-C35B42A0CD81}"/>
+                <a16:creationId xmlns:a16="http://schemas.microsoft.com/office/drawing/2014/main" xmlns="" id="{5FDBA27F-9676-4EE6-B75A-C35B42A0CD81}"/>
               </a:ext>
             </a:extLst>
           </p:cNvPr>
@@ -22809,7 +22800,7 @@
           <p:cNvPr id="23" name="Rectangle 22">
             <a:extLst>
               <a:ext uri="{FF2B5EF4-FFF2-40B4-BE49-F238E27FC236}">
-                <a16:creationId xmlns="" xmlns:a16="http://schemas.microsoft.com/office/drawing/2014/main" id="{EE1FC7B4-E4A7-4452-B413-1A623E3A7230}"/>
+                <a16:creationId xmlns:a16="http://schemas.microsoft.com/office/drawing/2014/main" xmlns="" id="{EE1FC7B4-E4A7-4452-B413-1A623E3A7230}"/>
               </a:ext>
             </a:extLst>
           </p:cNvPr>
@@ -22819,7 +22810,7 @@
           <p:nvPr>
             <p:extLst>
               <p:ext uri="{386F3935-93C4-4BCD-93E2-E3B085C9AB24}">
-                <p16:designElem xmlns="" xmlns:p16="http://schemas.microsoft.com/office/powerpoint/2015/main" val="1"/>
+                <p16:designElem xmlns:p16="http://schemas.microsoft.com/office/powerpoint/2015/main" xmlns="" val="1"/>
               </p:ext>
             </p:extLst>
           </p:nvPr>
@@ -22900,7 +22891,7 @@
           <p:cNvPr id="25" name="Freeform 13">
             <a:extLst>
               <a:ext uri="{FF2B5EF4-FFF2-40B4-BE49-F238E27FC236}">
-                <a16:creationId xmlns="" xmlns:a16="http://schemas.microsoft.com/office/drawing/2014/main" id="{E0709AF0-24F0-4486-B189-BE6386BDB198}"/>
+                <a16:creationId xmlns:a16="http://schemas.microsoft.com/office/drawing/2014/main" xmlns="" id="{E0709AF0-24F0-4486-B189-BE6386BDB198}"/>
               </a:ext>
             </a:extLst>
           </p:cNvPr>
@@ -22910,7 +22901,7 @@
           <p:nvPr>
             <p:extLst>
               <p:ext uri="{386F3935-93C4-4BCD-93E2-E3B085C9AB24}">
-                <p16:designElem xmlns="" xmlns:p16="http://schemas.microsoft.com/office/powerpoint/2015/main" val="1"/>
+                <p16:designElem xmlns:p16="http://schemas.microsoft.com/office/powerpoint/2015/main" xmlns="" val="1"/>
               </p:ext>
             </p:extLst>
           </p:nvPr>
@@ -23034,7 +23025,7 @@
           <p:cNvPr id="27" name="Freeform 11">
             <a:extLst>
               <a:ext uri="{FF2B5EF4-FFF2-40B4-BE49-F238E27FC236}">
-                <a16:creationId xmlns="" xmlns:a16="http://schemas.microsoft.com/office/drawing/2014/main" id="{FBE3B62F-5853-4A3C-B050-6186351A7176}"/>
+                <a16:creationId xmlns:a16="http://schemas.microsoft.com/office/drawing/2014/main" xmlns="" id="{FBE3B62F-5853-4A3C-B050-6186351A7176}"/>
               </a:ext>
             </a:extLst>
           </p:cNvPr>
@@ -23044,7 +23035,7 @@
           <p:nvPr>
             <p:extLst>
               <p:ext uri="{386F3935-93C4-4BCD-93E2-E3B085C9AB24}">
-                <p16:designElem xmlns="" xmlns:p16="http://schemas.microsoft.com/office/powerpoint/2015/main" val="1"/>
+                <p16:designElem xmlns:p16="http://schemas.microsoft.com/office/powerpoint/2015/main" xmlns="" val="1"/>
               </p:ext>
             </p:extLst>
           </p:nvPr>
@@ -23170,7 +23161,7 @@
           <p:cNvPr id="2" name="Title 1">
             <a:extLst>
               <a:ext uri="{FF2B5EF4-FFF2-40B4-BE49-F238E27FC236}">
-                <a16:creationId xmlns="" xmlns:a16="http://schemas.microsoft.com/office/drawing/2014/main" id="{A5F6196D-B07E-499E-92C0-6953CE9F25D4}"/>
+                <a16:creationId xmlns:a16="http://schemas.microsoft.com/office/drawing/2014/main" xmlns="" id="{A5F6196D-B07E-499E-92C0-6953CE9F25D4}"/>
               </a:ext>
             </a:extLst>
           </p:cNvPr>
@@ -23207,7 +23198,7 @@
           <p:cNvPr id="15" name="Content Placeholder 16">
             <a:extLst>
               <a:ext uri="{FF2B5EF4-FFF2-40B4-BE49-F238E27FC236}">
-                <a16:creationId xmlns="" xmlns:a16="http://schemas.microsoft.com/office/drawing/2014/main" id="{5FDBA27F-9676-4EE6-B75A-C35B42A0CD81}"/>
+                <a16:creationId xmlns:a16="http://schemas.microsoft.com/office/drawing/2014/main" xmlns="" id="{5FDBA27F-9676-4EE6-B75A-C35B42A0CD81}"/>
               </a:ext>
             </a:extLst>
           </p:cNvPr>
@@ -23403,7 +23394,7 @@
           <p:cNvPr id="18" name="Content Placeholder 16">
             <a:extLst>
               <a:ext uri="{FF2B5EF4-FFF2-40B4-BE49-F238E27FC236}">
-                <a16:creationId xmlns="" xmlns:a16="http://schemas.microsoft.com/office/drawing/2014/main" id="{5FDBA27F-9676-4EE6-B75A-C35B42A0CD81}"/>
+                <a16:creationId xmlns:a16="http://schemas.microsoft.com/office/drawing/2014/main" xmlns="" id="{5FDBA27F-9676-4EE6-B75A-C35B42A0CD81}"/>
               </a:ext>
             </a:extLst>
           </p:cNvPr>
@@ -23843,7 +23834,7 @@
           <p:cNvPr id="23" name="Rectangle 22">
             <a:extLst>
               <a:ext uri="{FF2B5EF4-FFF2-40B4-BE49-F238E27FC236}">
-                <a16:creationId xmlns="" xmlns:a16="http://schemas.microsoft.com/office/drawing/2014/main" id="{EE1FC7B4-E4A7-4452-B413-1A623E3A7230}"/>
+                <a16:creationId xmlns:a16="http://schemas.microsoft.com/office/drawing/2014/main" xmlns="" id="{EE1FC7B4-E4A7-4452-B413-1A623E3A7230}"/>
               </a:ext>
             </a:extLst>
           </p:cNvPr>
@@ -23853,7 +23844,7 @@
           <p:nvPr>
             <p:extLst>
               <p:ext uri="{386F3935-93C4-4BCD-93E2-E3B085C9AB24}">
-                <p16:designElem xmlns="" xmlns:p16="http://schemas.microsoft.com/office/powerpoint/2015/main" val="1"/>
+                <p16:designElem xmlns:p16="http://schemas.microsoft.com/office/powerpoint/2015/main" xmlns="" val="1"/>
               </p:ext>
             </p:extLst>
           </p:nvPr>
@@ -23934,7 +23925,7 @@
           <p:cNvPr id="25" name="Freeform 13">
             <a:extLst>
               <a:ext uri="{FF2B5EF4-FFF2-40B4-BE49-F238E27FC236}">
-                <a16:creationId xmlns="" xmlns:a16="http://schemas.microsoft.com/office/drawing/2014/main" id="{E0709AF0-24F0-4486-B189-BE6386BDB198}"/>
+                <a16:creationId xmlns:a16="http://schemas.microsoft.com/office/drawing/2014/main" xmlns="" id="{E0709AF0-24F0-4486-B189-BE6386BDB198}"/>
               </a:ext>
             </a:extLst>
           </p:cNvPr>
@@ -23944,7 +23935,7 @@
           <p:nvPr>
             <p:extLst>
               <p:ext uri="{386F3935-93C4-4BCD-93E2-E3B085C9AB24}">
-                <p16:designElem xmlns="" xmlns:p16="http://schemas.microsoft.com/office/powerpoint/2015/main" val="1"/>
+                <p16:designElem xmlns:p16="http://schemas.microsoft.com/office/powerpoint/2015/main" xmlns="" val="1"/>
               </p:ext>
             </p:extLst>
           </p:nvPr>
@@ -24068,7 +24059,7 @@
           <p:cNvPr id="27" name="Freeform 11">
             <a:extLst>
               <a:ext uri="{FF2B5EF4-FFF2-40B4-BE49-F238E27FC236}">
-                <a16:creationId xmlns="" xmlns:a16="http://schemas.microsoft.com/office/drawing/2014/main" id="{FBE3B62F-5853-4A3C-B050-6186351A7176}"/>
+                <a16:creationId xmlns:a16="http://schemas.microsoft.com/office/drawing/2014/main" xmlns="" id="{FBE3B62F-5853-4A3C-B050-6186351A7176}"/>
               </a:ext>
             </a:extLst>
           </p:cNvPr>
@@ -24078,7 +24069,7 @@
           <p:nvPr>
             <p:extLst>
               <p:ext uri="{386F3935-93C4-4BCD-93E2-E3B085C9AB24}">
-                <p16:designElem xmlns="" xmlns:p16="http://schemas.microsoft.com/office/powerpoint/2015/main" val="1"/>
+                <p16:designElem xmlns:p16="http://schemas.microsoft.com/office/powerpoint/2015/main" xmlns="" val="1"/>
               </p:ext>
             </p:extLst>
           </p:nvPr>
@@ -24204,7 +24195,7 @@
           <p:cNvPr id="2" name="Title 1">
             <a:extLst>
               <a:ext uri="{FF2B5EF4-FFF2-40B4-BE49-F238E27FC236}">
-                <a16:creationId xmlns="" xmlns:a16="http://schemas.microsoft.com/office/drawing/2014/main" id="{A5F6196D-B07E-499E-92C0-6953CE9F25D4}"/>
+                <a16:creationId xmlns:a16="http://schemas.microsoft.com/office/drawing/2014/main" xmlns="" id="{A5F6196D-B07E-499E-92C0-6953CE9F25D4}"/>
               </a:ext>
             </a:extLst>
           </p:cNvPr>
@@ -24233,8 +24224,8 @@
               <a:t>Arduino </a:t>
             </a:r>
             <a:r>
-              <a:rPr lang="en-US" b="1" dirty="0" err="1" smtClean="0"/>
-              <a:t>Excercises</a:t>
+              <a:rPr lang="en-US" b="1" dirty="0" smtClean="0"/>
+              <a:t>Exercises</a:t>
             </a:r>
             <a:endParaRPr lang="en-US" b="1" dirty="0"/>
           </a:p>
@@ -24293,7 +24284,7 @@
           <p:cNvPr id="23" name="Rectangle 22">
             <a:extLst>
               <a:ext uri="{FF2B5EF4-FFF2-40B4-BE49-F238E27FC236}">
-                <a16:creationId xmlns="" xmlns:a16="http://schemas.microsoft.com/office/drawing/2014/main" id="{EE1FC7B4-E4A7-4452-B413-1A623E3A7230}"/>
+                <a16:creationId xmlns:a16="http://schemas.microsoft.com/office/drawing/2014/main" xmlns="" id="{EE1FC7B4-E4A7-4452-B413-1A623E3A7230}"/>
               </a:ext>
             </a:extLst>
           </p:cNvPr>
@@ -24303,7 +24294,7 @@
           <p:nvPr>
             <p:extLst>
               <p:ext uri="{386F3935-93C4-4BCD-93E2-E3B085C9AB24}">
-                <p16:designElem xmlns="" xmlns:p16="http://schemas.microsoft.com/office/powerpoint/2015/main" val="1"/>
+                <p16:designElem xmlns:p16="http://schemas.microsoft.com/office/powerpoint/2015/main" xmlns="" val="1"/>
               </p:ext>
             </p:extLst>
           </p:nvPr>
@@ -24355,7 +24346,7 @@
           <p:cNvPr id="25" name="Freeform 13">
             <a:extLst>
               <a:ext uri="{FF2B5EF4-FFF2-40B4-BE49-F238E27FC236}">
-                <a16:creationId xmlns="" xmlns:a16="http://schemas.microsoft.com/office/drawing/2014/main" id="{E0709AF0-24F0-4486-B189-BE6386BDB198}"/>
+                <a16:creationId xmlns:a16="http://schemas.microsoft.com/office/drawing/2014/main" xmlns="" id="{E0709AF0-24F0-4486-B189-BE6386BDB198}"/>
               </a:ext>
             </a:extLst>
           </p:cNvPr>
@@ -24365,7 +24356,7 @@
           <p:nvPr>
             <p:extLst>
               <p:ext uri="{386F3935-93C4-4BCD-93E2-E3B085C9AB24}">
-                <p16:designElem xmlns="" xmlns:p16="http://schemas.microsoft.com/office/powerpoint/2015/main" val="1"/>
+                <p16:designElem xmlns:p16="http://schemas.microsoft.com/office/powerpoint/2015/main" xmlns="" val="1"/>
               </p:ext>
             </p:extLst>
           </p:nvPr>
@@ -24460,7 +24451,7 @@
           <p:cNvPr id="27" name="Freeform 11">
             <a:extLst>
               <a:ext uri="{FF2B5EF4-FFF2-40B4-BE49-F238E27FC236}">
-                <a16:creationId xmlns="" xmlns:a16="http://schemas.microsoft.com/office/drawing/2014/main" id="{FBE3B62F-5853-4A3C-B050-6186351A7176}"/>
+                <a16:creationId xmlns:a16="http://schemas.microsoft.com/office/drawing/2014/main" xmlns="" id="{FBE3B62F-5853-4A3C-B050-6186351A7176}"/>
               </a:ext>
             </a:extLst>
           </p:cNvPr>
@@ -24470,7 +24461,7 @@
           <p:nvPr>
             <p:extLst>
               <p:ext uri="{386F3935-93C4-4BCD-93E2-E3B085C9AB24}">
-                <p16:designElem xmlns="" xmlns:p16="http://schemas.microsoft.com/office/powerpoint/2015/main" val="1"/>
+                <p16:designElem xmlns:p16="http://schemas.microsoft.com/office/powerpoint/2015/main" xmlns="" val="1"/>
               </p:ext>
             </p:extLst>
           </p:nvPr>
@@ -24567,7 +24558,7 @@
           <p:cNvPr id="2" name="Title 1">
             <a:extLst>
               <a:ext uri="{FF2B5EF4-FFF2-40B4-BE49-F238E27FC236}">
-                <a16:creationId xmlns="" xmlns:a16="http://schemas.microsoft.com/office/drawing/2014/main" id="{A5F6196D-B07E-499E-92C0-6953CE9F25D4}"/>
+                <a16:creationId xmlns:a16="http://schemas.microsoft.com/office/drawing/2014/main" xmlns="" id="{A5F6196D-B07E-499E-92C0-6953CE9F25D4}"/>
               </a:ext>
             </a:extLst>
           </p:cNvPr>
@@ -24603,7 +24594,7 @@
           <p:cNvPr id="17" name="Content Placeholder 16">
             <a:extLst>
               <a:ext uri="{FF2B5EF4-FFF2-40B4-BE49-F238E27FC236}">
-                <a16:creationId xmlns="" xmlns:a16="http://schemas.microsoft.com/office/drawing/2014/main" id="{5FDBA27F-9676-4EE6-B75A-C35B42A0CD81}"/>
+                <a16:creationId xmlns:a16="http://schemas.microsoft.com/office/drawing/2014/main" xmlns="" id="{5FDBA27F-9676-4EE6-B75A-C35B42A0CD81}"/>
               </a:ext>
             </a:extLst>
           </p:cNvPr>
@@ -24825,7 +24816,7 @@
           <p:cNvPr id="23" name="Rectangle 22">
             <a:extLst>
               <a:ext uri="{FF2B5EF4-FFF2-40B4-BE49-F238E27FC236}">
-                <a16:creationId xmlns="" xmlns:a16="http://schemas.microsoft.com/office/drawing/2014/main" id="{EE1FC7B4-E4A7-4452-B413-1A623E3A7230}"/>
+                <a16:creationId xmlns:a16="http://schemas.microsoft.com/office/drawing/2014/main" xmlns="" id="{EE1FC7B4-E4A7-4452-B413-1A623E3A7230}"/>
               </a:ext>
             </a:extLst>
           </p:cNvPr>
@@ -24835,7 +24826,7 @@
           <p:nvPr>
             <p:extLst>
               <p:ext uri="{386F3935-93C4-4BCD-93E2-E3B085C9AB24}">
-                <p16:designElem xmlns="" xmlns:p16="http://schemas.microsoft.com/office/powerpoint/2015/main" val="1"/>
+                <p16:designElem xmlns:p16="http://schemas.microsoft.com/office/powerpoint/2015/main" xmlns="" val="1"/>
               </p:ext>
             </p:extLst>
           </p:nvPr>
@@ -24916,7 +24907,7 @@
           <p:cNvPr id="25" name="Freeform 13">
             <a:extLst>
               <a:ext uri="{FF2B5EF4-FFF2-40B4-BE49-F238E27FC236}">
-                <a16:creationId xmlns="" xmlns:a16="http://schemas.microsoft.com/office/drawing/2014/main" id="{E0709AF0-24F0-4486-B189-BE6386BDB198}"/>
+                <a16:creationId xmlns:a16="http://schemas.microsoft.com/office/drawing/2014/main" xmlns="" id="{E0709AF0-24F0-4486-B189-BE6386BDB198}"/>
               </a:ext>
             </a:extLst>
           </p:cNvPr>
@@ -24926,7 +24917,7 @@
           <p:nvPr>
             <p:extLst>
               <p:ext uri="{386F3935-93C4-4BCD-93E2-E3B085C9AB24}">
-                <p16:designElem xmlns="" xmlns:p16="http://schemas.microsoft.com/office/powerpoint/2015/main" val="1"/>
+                <p16:designElem xmlns:p16="http://schemas.microsoft.com/office/powerpoint/2015/main" xmlns="" val="1"/>
               </p:ext>
             </p:extLst>
           </p:nvPr>
@@ -25050,7 +25041,7 @@
           <p:cNvPr id="27" name="Freeform 11">
             <a:extLst>
               <a:ext uri="{FF2B5EF4-FFF2-40B4-BE49-F238E27FC236}">
-                <a16:creationId xmlns="" xmlns:a16="http://schemas.microsoft.com/office/drawing/2014/main" id="{FBE3B62F-5853-4A3C-B050-6186351A7176}"/>
+                <a16:creationId xmlns:a16="http://schemas.microsoft.com/office/drawing/2014/main" xmlns="" id="{FBE3B62F-5853-4A3C-B050-6186351A7176}"/>
               </a:ext>
             </a:extLst>
           </p:cNvPr>
@@ -25060,7 +25051,7 @@
           <p:nvPr>
             <p:extLst>
               <p:ext uri="{386F3935-93C4-4BCD-93E2-E3B085C9AB24}">
-                <p16:designElem xmlns="" xmlns:p16="http://schemas.microsoft.com/office/powerpoint/2015/main" val="1"/>
+                <p16:designElem xmlns:p16="http://schemas.microsoft.com/office/powerpoint/2015/main" xmlns="" val="1"/>
               </p:ext>
             </p:extLst>
           </p:nvPr>
@@ -25186,7 +25177,7 @@
           <p:cNvPr id="2" name="Title 1">
             <a:extLst>
               <a:ext uri="{FF2B5EF4-FFF2-40B4-BE49-F238E27FC236}">
-                <a16:creationId xmlns="" xmlns:a16="http://schemas.microsoft.com/office/drawing/2014/main" id="{A5F6196D-B07E-499E-92C0-6953CE9F25D4}"/>
+                <a16:creationId xmlns:a16="http://schemas.microsoft.com/office/drawing/2014/main" xmlns="" id="{A5F6196D-B07E-499E-92C0-6953CE9F25D4}"/>
               </a:ext>
             </a:extLst>
           </p:cNvPr>
@@ -25222,7 +25213,7 @@
           <p:cNvPr id="17" name="Content Placeholder 16">
             <a:extLst>
               <a:ext uri="{FF2B5EF4-FFF2-40B4-BE49-F238E27FC236}">
-                <a16:creationId xmlns="" xmlns:a16="http://schemas.microsoft.com/office/drawing/2014/main" id="{5FDBA27F-9676-4EE6-B75A-C35B42A0CD81}"/>
+                <a16:creationId xmlns:a16="http://schemas.microsoft.com/office/drawing/2014/main" xmlns="" id="{5FDBA27F-9676-4EE6-B75A-C35B42A0CD81}"/>
               </a:ext>
             </a:extLst>
           </p:cNvPr>
@@ -25312,7 +25303,7 @@
           <p:cNvPr id="23" name="Rectangle 22">
             <a:extLst>
               <a:ext uri="{FF2B5EF4-FFF2-40B4-BE49-F238E27FC236}">
-                <a16:creationId xmlns="" xmlns:a16="http://schemas.microsoft.com/office/drawing/2014/main" id="{EE1FC7B4-E4A7-4452-B413-1A623E3A7230}"/>
+                <a16:creationId xmlns:a16="http://schemas.microsoft.com/office/drawing/2014/main" xmlns="" id="{EE1FC7B4-E4A7-4452-B413-1A623E3A7230}"/>
               </a:ext>
             </a:extLst>
           </p:cNvPr>
@@ -25322,7 +25313,7 @@
           <p:nvPr>
             <p:extLst>
               <p:ext uri="{386F3935-93C4-4BCD-93E2-E3B085C9AB24}">
-                <p16:designElem xmlns="" xmlns:p16="http://schemas.microsoft.com/office/powerpoint/2015/main" val="1"/>
+                <p16:designElem xmlns:p16="http://schemas.microsoft.com/office/powerpoint/2015/main" xmlns="" val="1"/>
               </p:ext>
             </p:extLst>
           </p:nvPr>
@@ -25403,7 +25394,7 @@
           <p:cNvPr id="25" name="Freeform 13">
             <a:extLst>
               <a:ext uri="{FF2B5EF4-FFF2-40B4-BE49-F238E27FC236}">
-                <a16:creationId xmlns="" xmlns:a16="http://schemas.microsoft.com/office/drawing/2014/main" id="{E0709AF0-24F0-4486-B189-BE6386BDB198}"/>
+                <a16:creationId xmlns:a16="http://schemas.microsoft.com/office/drawing/2014/main" xmlns="" id="{E0709AF0-24F0-4486-B189-BE6386BDB198}"/>
               </a:ext>
             </a:extLst>
           </p:cNvPr>
@@ -25413,7 +25404,7 @@
           <p:nvPr>
             <p:extLst>
               <p:ext uri="{386F3935-93C4-4BCD-93E2-E3B085C9AB24}">
-                <p16:designElem xmlns="" xmlns:p16="http://schemas.microsoft.com/office/powerpoint/2015/main" val="1"/>
+                <p16:designElem xmlns:p16="http://schemas.microsoft.com/office/powerpoint/2015/main" xmlns="" val="1"/>
               </p:ext>
             </p:extLst>
           </p:nvPr>
@@ -25537,7 +25528,7 @@
           <p:cNvPr id="27" name="Freeform 11">
             <a:extLst>
               <a:ext uri="{FF2B5EF4-FFF2-40B4-BE49-F238E27FC236}">
-                <a16:creationId xmlns="" xmlns:a16="http://schemas.microsoft.com/office/drawing/2014/main" id="{FBE3B62F-5853-4A3C-B050-6186351A7176}"/>
+                <a16:creationId xmlns:a16="http://schemas.microsoft.com/office/drawing/2014/main" xmlns="" id="{FBE3B62F-5853-4A3C-B050-6186351A7176}"/>
               </a:ext>
             </a:extLst>
           </p:cNvPr>
@@ -25547,7 +25538,7 @@
           <p:nvPr>
             <p:extLst>
               <p:ext uri="{386F3935-93C4-4BCD-93E2-E3B085C9AB24}">
-                <p16:designElem xmlns="" xmlns:p16="http://schemas.microsoft.com/office/powerpoint/2015/main" val="1"/>
+                <p16:designElem xmlns:p16="http://schemas.microsoft.com/office/powerpoint/2015/main" xmlns="" val="1"/>
               </p:ext>
             </p:extLst>
           </p:nvPr>
@@ -25673,7 +25664,7 @@
           <p:cNvPr id="2" name="Title 1">
             <a:extLst>
               <a:ext uri="{FF2B5EF4-FFF2-40B4-BE49-F238E27FC236}">
-                <a16:creationId xmlns="" xmlns:a16="http://schemas.microsoft.com/office/drawing/2014/main" id="{A5F6196D-B07E-499E-92C0-6953CE9F25D4}"/>
+                <a16:creationId xmlns:a16="http://schemas.microsoft.com/office/drawing/2014/main" xmlns="" id="{A5F6196D-B07E-499E-92C0-6953CE9F25D4}"/>
               </a:ext>
             </a:extLst>
           </p:cNvPr>
@@ -25709,7 +25700,7 @@
           <p:cNvPr id="17" name="Content Placeholder 16">
             <a:extLst>
               <a:ext uri="{FF2B5EF4-FFF2-40B4-BE49-F238E27FC236}">
-                <a16:creationId xmlns="" xmlns:a16="http://schemas.microsoft.com/office/drawing/2014/main" id="{5FDBA27F-9676-4EE6-B75A-C35B42A0CD81}"/>
+                <a16:creationId xmlns:a16="http://schemas.microsoft.com/office/drawing/2014/main" xmlns="" id="{5FDBA27F-9676-4EE6-B75A-C35B42A0CD81}"/>
               </a:ext>
             </a:extLst>
           </p:cNvPr>
@@ -25883,7 +25874,7 @@
           <p:cNvPr id="23" name="Rectangle 22">
             <a:extLst>
               <a:ext uri="{FF2B5EF4-FFF2-40B4-BE49-F238E27FC236}">
-                <a16:creationId xmlns="" xmlns:a16="http://schemas.microsoft.com/office/drawing/2014/main" id="{EE1FC7B4-E4A7-4452-B413-1A623E3A7230}"/>
+                <a16:creationId xmlns:a16="http://schemas.microsoft.com/office/drawing/2014/main" xmlns="" id="{EE1FC7B4-E4A7-4452-B413-1A623E3A7230}"/>
               </a:ext>
             </a:extLst>
           </p:cNvPr>
@@ -25893,7 +25884,7 @@
           <p:nvPr>
             <p:extLst>
               <p:ext uri="{386F3935-93C4-4BCD-93E2-E3B085C9AB24}">
-                <p16:designElem xmlns="" xmlns:p16="http://schemas.microsoft.com/office/powerpoint/2015/main" val="1"/>
+                <p16:designElem xmlns:p16="http://schemas.microsoft.com/office/powerpoint/2015/main" xmlns="" val="1"/>
               </p:ext>
             </p:extLst>
           </p:nvPr>
@@ -25974,7 +25965,7 @@
           <p:cNvPr id="25" name="Freeform 13">
             <a:extLst>
               <a:ext uri="{FF2B5EF4-FFF2-40B4-BE49-F238E27FC236}">
-                <a16:creationId xmlns="" xmlns:a16="http://schemas.microsoft.com/office/drawing/2014/main" id="{E0709AF0-24F0-4486-B189-BE6386BDB198}"/>
+                <a16:creationId xmlns:a16="http://schemas.microsoft.com/office/drawing/2014/main" xmlns="" id="{E0709AF0-24F0-4486-B189-BE6386BDB198}"/>
               </a:ext>
             </a:extLst>
           </p:cNvPr>
@@ -25984,7 +25975,7 @@
           <p:nvPr>
             <p:extLst>
               <p:ext uri="{386F3935-93C4-4BCD-93E2-E3B085C9AB24}">
-                <p16:designElem xmlns="" xmlns:p16="http://schemas.microsoft.com/office/powerpoint/2015/main" val="1"/>
+                <p16:designElem xmlns:p16="http://schemas.microsoft.com/office/powerpoint/2015/main" xmlns="" val="1"/>
               </p:ext>
             </p:extLst>
           </p:nvPr>
@@ -26108,7 +26099,7 @@
           <p:cNvPr id="27" name="Freeform 11">
             <a:extLst>
               <a:ext uri="{FF2B5EF4-FFF2-40B4-BE49-F238E27FC236}">
-                <a16:creationId xmlns="" xmlns:a16="http://schemas.microsoft.com/office/drawing/2014/main" id="{FBE3B62F-5853-4A3C-B050-6186351A7176}"/>
+                <a16:creationId xmlns:a16="http://schemas.microsoft.com/office/drawing/2014/main" xmlns="" id="{FBE3B62F-5853-4A3C-B050-6186351A7176}"/>
               </a:ext>
             </a:extLst>
           </p:cNvPr>
@@ -26118,7 +26109,7 @@
           <p:nvPr>
             <p:extLst>
               <p:ext uri="{386F3935-93C4-4BCD-93E2-E3B085C9AB24}">
-                <p16:designElem xmlns="" xmlns:p16="http://schemas.microsoft.com/office/powerpoint/2015/main" val="1"/>
+                <p16:designElem xmlns:p16="http://schemas.microsoft.com/office/powerpoint/2015/main" xmlns="" val="1"/>
               </p:ext>
             </p:extLst>
           </p:nvPr>
@@ -26244,7 +26235,7 @@
           <p:cNvPr id="2" name="Title 1">
             <a:extLst>
               <a:ext uri="{FF2B5EF4-FFF2-40B4-BE49-F238E27FC236}">
-                <a16:creationId xmlns="" xmlns:a16="http://schemas.microsoft.com/office/drawing/2014/main" id="{A5F6196D-B07E-499E-92C0-6953CE9F25D4}"/>
+                <a16:creationId xmlns:a16="http://schemas.microsoft.com/office/drawing/2014/main" xmlns="" id="{A5F6196D-B07E-499E-92C0-6953CE9F25D4}"/>
               </a:ext>
             </a:extLst>
           </p:cNvPr>
@@ -26280,7 +26271,7 @@
           <p:cNvPr id="17" name="Content Placeholder 16">
             <a:extLst>
               <a:ext uri="{FF2B5EF4-FFF2-40B4-BE49-F238E27FC236}">
-                <a16:creationId xmlns="" xmlns:a16="http://schemas.microsoft.com/office/drawing/2014/main" id="{5FDBA27F-9676-4EE6-B75A-C35B42A0CD81}"/>
+                <a16:creationId xmlns:a16="http://schemas.microsoft.com/office/drawing/2014/main" xmlns="" id="{5FDBA27F-9676-4EE6-B75A-C35B42A0CD81}"/>
               </a:ext>
             </a:extLst>
           </p:cNvPr>
@@ -26440,7 +26431,7 @@
           <p:cNvPr id="15" name="Content Placeholder 16">
             <a:extLst>
               <a:ext uri="{FF2B5EF4-FFF2-40B4-BE49-F238E27FC236}">
-                <a16:creationId xmlns="" xmlns:a16="http://schemas.microsoft.com/office/drawing/2014/main" id="{5FDBA27F-9676-4EE6-B75A-C35B42A0CD81}"/>
+                <a16:creationId xmlns:a16="http://schemas.microsoft.com/office/drawing/2014/main" xmlns="" id="{5FDBA27F-9676-4EE6-B75A-C35B42A0CD81}"/>
               </a:ext>
             </a:extLst>
           </p:cNvPr>
@@ -26655,7 +26646,7 @@
           <p:cNvPr id="18" name="Content Placeholder 16">
             <a:extLst>
               <a:ext uri="{FF2B5EF4-FFF2-40B4-BE49-F238E27FC236}">
-                <a16:creationId xmlns="" xmlns:a16="http://schemas.microsoft.com/office/drawing/2014/main" id="{5FDBA27F-9676-4EE6-B75A-C35B42A0CD81}"/>
+                <a16:creationId xmlns:a16="http://schemas.microsoft.com/office/drawing/2014/main" xmlns="" id="{5FDBA27F-9676-4EE6-B75A-C35B42A0CD81}"/>
               </a:ext>
             </a:extLst>
           </p:cNvPr>
@@ -26918,7 +26909,7 @@
           <p:cNvPr id="20" name="Content Placeholder 16">
             <a:extLst>
               <a:ext uri="{FF2B5EF4-FFF2-40B4-BE49-F238E27FC236}">
-                <a16:creationId xmlns="" xmlns:a16="http://schemas.microsoft.com/office/drawing/2014/main" id="{5FDBA27F-9676-4EE6-B75A-C35B42A0CD81}"/>
+                <a16:creationId xmlns:a16="http://schemas.microsoft.com/office/drawing/2014/main" xmlns="" id="{5FDBA27F-9676-4EE6-B75A-C35B42A0CD81}"/>
               </a:ext>
             </a:extLst>
           </p:cNvPr>
@@ -27122,15 +27113,7 @@
           <a:p>
             <a:r>
               <a:rPr lang="en-US" dirty="0" smtClean="0"/>
-              <a:t>_ _ _                 0</a:t>
-            </a:r>
-            <a:r>
-              <a:rPr lang="en-US" dirty="0" smtClean="0"/>
-              <a:t>…..</a:t>
-            </a:r>
-            <a:r>
-              <a:rPr lang="en-US" dirty="0" smtClean="0"/>
-              <a:t>FFF</a:t>
+              <a:t>_ _ _                 0…..FFF</a:t>
             </a:r>
             <a:endParaRPr lang="en-US" dirty="0"/>
           </a:p>
@@ -27189,7 +27172,7 @@
           <p:cNvPr id="23" name="Rectangle 22">
             <a:extLst>
               <a:ext uri="{FF2B5EF4-FFF2-40B4-BE49-F238E27FC236}">
-                <a16:creationId xmlns="" xmlns:a16="http://schemas.microsoft.com/office/drawing/2014/main" id="{EE1FC7B4-E4A7-4452-B413-1A623E3A7230}"/>
+                <a16:creationId xmlns:a16="http://schemas.microsoft.com/office/drawing/2014/main" xmlns="" id="{EE1FC7B4-E4A7-4452-B413-1A623E3A7230}"/>
               </a:ext>
             </a:extLst>
           </p:cNvPr>
@@ -27199,7 +27182,7 @@
           <p:nvPr>
             <p:extLst>
               <p:ext uri="{386F3935-93C4-4BCD-93E2-E3B085C9AB24}">
-                <p16:designElem xmlns="" xmlns:p16="http://schemas.microsoft.com/office/powerpoint/2015/main" val="1"/>
+                <p16:designElem xmlns:p16="http://schemas.microsoft.com/office/powerpoint/2015/main" xmlns="" val="1"/>
               </p:ext>
             </p:extLst>
           </p:nvPr>
@@ -27280,7 +27263,7 @@
           <p:cNvPr id="25" name="Freeform 13">
             <a:extLst>
               <a:ext uri="{FF2B5EF4-FFF2-40B4-BE49-F238E27FC236}">
-                <a16:creationId xmlns="" xmlns:a16="http://schemas.microsoft.com/office/drawing/2014/main" id="{E0709AF0-24F0-4486-B189-BE6386BDB198}"/>
+                <a16:creationId xmlns:a16="http://schemas.microsoft.com/office/drawing/2014/main" xmlns="" id="{E0709AF0-24F0-4486-B189-BE6386BDB198}"/>
               </a:ext>
             </a:extLst>
           </p:cNvPr>
@@ -27290,7 +27273,7 @@
           <p:nvPr>
             <p:extLst>
               <p:ext uri="{386F3935-93C4-4BCD-93E2-E3B085C9AB24}">
-                <p16:designElem xmlns="" xmlns:p16="http://schemas.microsoft.com/office/powerpoint/2015/main" val="1"/>
+                <p16:designElem xmlns:p16="http://schemas.microsoft.com/office/powerpoint/2015/main" xmlns="" val="1"/>
               </p:ext>
             </p:extLst>
           </p:nvPr>
@@ -27414,7 +27397,7 @@
           <p:cNvPr id="27" name="Freeform 11">
             <a:extLst>
               <a:ext uri="{FF2B5EF4-FFF2-40B4-BE49-F238E27FC236}">
-                <a16:creationId xmlns="" xmlns:a16="http://schemas.microsoft.com/office/drawing/2014/main" id="{FBE3B62F-5853-4A3C-B050-6186351A7176}"/>
+                <a16:creationId xmlns:a16="http://schemas.microsoft.com/office/drawing/2014/main" xmlns="" id="{FBE3B62F-5853-4A3C-B050-6186351A7176}"/>
               </a:ext>
             </a:extLst>
           </p:cNvPr>
@@ -27424,7 +27407,7 @@
           <p:nvPr>
             <p:extLst>
               <p:ext uri="{386F3935-93C4-4BCD-93E2-E3B085C9AB24}">
-                <p16:designElem xmlns="" xmlns:p16="http://schemas.microsoft.com/office/powerpoint/2015/main" val="1"/>
+                <p16:designElem xmlns:p16="http://schemas.microsoft.com/office/powerpoint/2015/main" xmlns="" val="1"/>
               </p:ext>
             </p:extLst>
           </p:nvPr>
@@ -27550,7 +27533,7 @@
           <p:cNvPr id="2" name="Title 1">
             <a:extLst>
               <a:ext uri="{FF2B5EF4-FFF2-40B4-BE49-F238E27FC236}">
-                <a16:creationId xmlns="" xmlns:a16="http://schemas.microsoft.com/office/drawing/2014/main" id="{A5F6196D-B07E-499E-92C0-6953CE9F25D4}"/>
+                <a16:creationId xmlns:a16="http://schemas.microsoft.com/office/drawing/2014/main" xmlns="" id="{A5F6196D-B07E-499E-92C0-6953CE9F25D4}"/>
               </a:ext>
             </a:extLst>
           </p:cNvPr>
@@ -27586,7 +27569,7 @@
           <p:cNvPr id="17" name="Content Placeholder 16">
             <a:extLst>
               <a:ext uri="{FF2B5EF4-FFF2-40B4-BE49-F238E27FC236}">
-                <a16:creationId xmlns="" xmlns:a16="http://schemas.microsoft.com/office/drawing/2014/main" id="{5FDBA27F-9676-4EE6-B75A-C35B42A0CD81}"/>
+                <a16:creationId xmlns:a16="http://schemas.microsoft.com/office/drawing/2014/main" xmlns="" id="{5FDBA27F-9676-4EE6-B75A-C35B42A0CD81}"/>
               </a:ext>
             </a:extLst>
           </p:cNvPr>
@@ -27813,7 +27796,7 @@
           <p:cNvPr id="15" name="Content Placeholder 16">
             <a:extLst>
               <a:ext uri="{FF2B5EF4-FFF2-40B4-BE49-F238E27FC236}">
-                <a16:creationId xmlns="" xmlns:a16="http://schemas.microsoft.com/office/drawing/2014/main" id="{5FDBA27F-9676-4EE6-B75A-C35B42A0CD81}"/>
+                <a16:creationId xmlns:a16="http://schemas.microsoft.com/office/drawing/2014/main" xmlns="" id="{5FDBA27F-9676-4EE6-B75A-C35B42A0CD81}"/>
               </a:ext>
             </a:extLst>
           </p:cNvPr>
@@ -28009,7 +27992,7 @@
           <p:cNvPr id="18" name="Content Placeholder 16">
             <a:extLst>
               <a:ext uri="{FF2B5EF4-FFF2-40B4-BE49-F238E27FC236}">
-                <a16:creationId xmlns="" xmlns:a16="http://schemas.microsoft.com/office/drawing/2014/main" id="{5FDBA27F-9676-4EE6-B75A-C35B42A0CD81}"/>
+                <a16:creationId xmlns:a16="http://schemas.microsoft.com/office/drawing/2014/main" xmlns="" id="{5FDBA27F-9676-4EE6-B75A-C35B42A0CD81}"/>
               </a:ext>
             </a:extLst>
           </p:cNvPr>
@@ -28253,7 +28236,7 @@
           <p:cNvPr id="23" name="Rectangle 22">
             <a:extLst>
               <a:ext uri="{FF2B5EF4-FFF2-40B4-BE49-F238E27FC236}">
-                <a16:creationId xmlns="" xmlns:a16="http://schemas.microsoft.com/office/drawing/2014/main" id="{EE1FC7B4-E4A7-4452-B413-1A623E3A7230}"/>
+                <a16:creationId xmlns:a16="http://schemas.microsoft.com/office/drawing/2014/main" xmlns="" id="{EE1FC7B4-E4A7-4452-B413-1A623E3A7230}"/>
               </a:ext>
             </a:extLst>
           </p:cNvPr>
@@ -28263,7 +28246,7 @@
           <p:nvPr>
             <p:extLst>
               <p:ext uri="{386F3935-93C4-4BCD-93E2-E3B085C9AB24}">
-                <p16:designElem xmlns="" xmlns:p16="http://schemas.microsoft.com/office/powerpoint/2015/main" val="1"/>
+                <p16:designElem xmlns:p16="http://schemas.microsoft.com/office/powerpoint/2015/main" xmlns="" val="1"/>
               </p:ext>
             </p:extLst>
           </p:nvPr>
@@ -28344,7 +28327,7 @@
           <p:cNvPr id="25" name="Freeform 13">
             <a:extLst>
               <a:ext uri="{FF2B5EF4-FFF2-40B4-BE49-F238E27FC236}">
-                <a16:creationId xmlns="" xmlns:a16="http://schemas.microsoft.com/office/drawing/2014/main" id="{E0709AF0-24F0-4486-B189-BE6386BDB198}"/>
+                <a16:creationId xmlns:a16="http://schemas.microsoft.com/office/drawing/2014/main" xmlns="" id="{E0709AF0-24F0-4486-B189-BE6386BDB198}"/>
               </a:ext>
             </a:extLst>
           </p:cNvPr>
@@ -28354,7 +28337,7 @@
           <p:nvPr>
             <p:extLst>
               <p:ext uri="{386F3935-93C4-4BCD-93E2-E3B085C9AB24}">
-                <p16:designElem xmlns="" xmlns:p16="http://schemas.microsoft.com/office/powerpoint/2015/main" val="1"/>
+                <p16:designElem xmlns:p16="http://schemas.microsoft.com/office/powerpoint/2015/main" xmlns="" val="1"/>
               </p:ext>
             </p:extLst>
           </p:nvPr>
@@ -28478,7 +28461,7 @@
           <p:cNvPr id="27" name="Freeform 11">
             <a:extLst>
               <a:ext uri="{FF2B5EF4-FFF2-40B4-BE49-F238E27FC236}">
-                <a16:creationId xmlns="" xmlns:a16="http://schemas.microsoft.com/office/drawing/2014/main" id="{FBE3B62F-5853-4A3C-B050-6186351A7176}"/>
+                <a16:creationId xmlns:a16="http://schemas.microsoft.com/office/drawing/2014/main" xmlns="" id="{FBE3B62F-5853-4A3C-B050-6186351A7176}"/>
               </a:ext>
             </a:extLst>
           </p:cNvPr>
@@ -28488,7 +28471,7 @@
           <p:nvPr>
             <p:extLst>
               <p:ext uri="{386F3935-93C4-4BCD-93E2-E3B085C9AB24}">
-                <p16:designElem xmlns="" xmlns:p16="http://schemas.microsoft.com/office/powerpoint/2015/main" val="1"/>
+                <p16:designElem xmlns:p16="http://schemas.microsoft.com/office/powerpoint/2015/main" xmlns="" val="1"/>
               </p:ext>
             </p:extLst>
           </p:nvPr>
@@ -28614,7 +28597,7 @@
           <p:cNvPr id="2" name="Title 1">
             <a:extLst>
               <a:ext uri="{FF2B5EF4-FFF2-40B4-BE49-F238E27FC236}">
-                <a16:creationId xmlns="" xmlns:a16="http://schemas.microsoft.com/office/drawing/2014/main" id="{A5F6196D-B07E-499E-92C0-6953CE9F25D4}"/>
+                <a16:creationId xmlns:a16="http://schemas.microsoft.com/office/drawing/2014/main" xmlns="" id="{A5F6196D-B07E-499E-92C0-6953CE9F25D4}"/>
               </a:ext>
             </a:extLst>
           </p:cNvPr>
@@ -28639,11 +28622,7 @@
           <a:p>
             <a:r>
               <a:rPr lang="en-US" b="1" dirty="0" smtClean="0"/>
-              <a:t>Counting</a:t>
-            </a:r>
-            <a:r>
-              <a:rPr lang="en-US" b="1" dirty="0" smtClean="0"/>
-              <a:t>… (Unsigned)</a:t>
+              <a:t>Counting… (Unsigned)</a:t>
             </a:r>
             <a:endParaRPr lang="en-US" b="1" dirty="0"/>
           </a:p>
@@ -29003,7 +28982,7 @@
           <p:cNvPr id="15" name="Content Placeholder 16">
             <a:extLst>
               <a:ext uri="{FF2B5EF4-FFF2-40B4-BE49-F238E27FC236}">
-                <a16:creationId xmlns="" xmlns:a16="http://schemas.microsoft.com/office/drawing/2014/main" id="{5FDBA27F-9676-4EE6-B75A-C35B42A0CD81}"/>
+                <a16:creationId xmlns:a16="http://schemas.microsoft.com/office/drawing/2014/main" xmlns="" id="{5FDBA27F-9676-4EE6-B75A-C35B42A0CD81}"/>
               </a:ext>
             </a:extLst>
           </p:cNvPr>
@@ -29199,7 +29178,7 @@
           <p:cNvPr id="18" name="Content Placeholder 16">
             <a:extLst>
               <a:ext uri="{FF2B5EF4-FFF2-40B4-BE49-F238E27FC236}">
-                <a16:creationId xmlns="" xmlns:a16="http://schemas.microsoft.com/office/drawing/2014/main" id="{5FDBA27F-9676-4EE6-B75A-C35B42A0CD81}"/>
+                <a16:creationId xmlns:a16="http://schemas.microsoft.com/office/drawing/2014/main" xmlns="" id="{5FDBA27F-9676-4EE6-B75A-C35B42A0CD81}"/>
               </a:ext>
             </a:extLst>
           </p:cNvPr>
@@ -29563,7 +29542,7 @@
           <p:cNvPr id="23" name="Rectangle 22">
             <a:extLst>
               <a:ext uri="{FF2B5EF4-FFF2-40B4-BE49-F238E27FC236}">
-                <a16:creationId xmlns="" xmlns:a16="http://schemas.microsoft.com/office/drawing/2014/main" id="{EE1FC7B4-E4A7-4452-B413-1A623E3A7230}"/>
+                <a16:creationId xmlns:a16="http://schemas.microsoft.com/office/drawing/2014/main" xmlns="" id="{EE1FC7B4-E4A7-4452-B413-1A623E3A7230}"/>
               </a:ext>
             </a:extLst>
           </p:cNvPr>
@@ -29573,7 +29552,7 @@
           <p:nvPr>
             <p:extLst>
               <p:ext uri="{386F3935-93C4-4BCD-93E2-E3B085C9AB24}">
-                <p16:designElem xmlns="" xmlns:p16="http://schemas.microsoft.com/office/powerpoint/2015/main" val="1"/>
+                <p16:designElem xmlns:p16="http://schemas.microsoft.com/office/powerpoint/2015/main" xmlns="" val="1"/>
               </p:ext>
             </p:extLst>
           </p:nvPr>
@@ -29654,7 +29633,7 @@
           <p:cNvPr id="25" name="Freeform 13">
             <a:extLst>
               <a:ext uri="{FF2B5EF4-FFF2-40B4-BE49-F238E27FC236}">
-                <a16:creationId xmlns="" xmlns:a16="http://schemas.microsoft.com/office/drawing/2014/main" id="{E0709AF0-24F0-4486-B189-BE6386BDB198}"/>
+                <a16:creationId xmlns:a16="http://schemas.microsoft.com/office/drawing/2014/main" xmlns="" id="{E0709AF0-24F0-4486-B189-BE6386BDB198}"/>
               </a:ext>
             </a:extLst>
           </p:cNvPr>
@@ -29664,7 +29643,7 @@
           <p:nvPr>
             <p:extLst>
               <p:ext uri="{386F3935-93C4-4BCD-93E2-E3B085C9AB24}">
-                <p16:designElem xmlns="" xmlns:p16="http://schemas.microsoft.com/office/powerpoint/2015/main" val="1"/>
+                <p16:designElem xmlns:p16="http://schemas.microsoft.com/office/powerpoint/2015/main" xmlns="" val="1"/>
               </p:ext>
             </p:extLst>
           </p:nvPr>
@@ -29788,7 +29767,7 @@
           <p:cNvPr id="27" name="Freeform 11">
             <a:extLst>
               <a:ext uri="{FF2B5EF4-FFF2-40B4-BE49-F238E27FC236}">
-                <a16:creationId xmlns="" xmlns:a16="http://schemas.microsoft.com/office/drawing/2014/main" id="{FBE3B62F-5853-4A3C-B050-6186351A7176}"/>
+                <a16:creationId xmlns:a16="http://schemas.microsoft.com/office/drawing/2014/main" xmlns="" id="{FBE3B62F-5853-4A3C-B050-6186351A7176}"/>
               </a:ext>
             </a:extLst>
           </p:cNvPr>
@@ -29798,7 +29777,7 @@
           <p:nvPr>
             <p:extLst>
               <p:ext uri="{386F3935-93C4-4BCD-93E2-E3B085C9AB24}">
-                <p16:designElem xmlns="" xmlns:p16="http://schemas.microsoft.com/office/powerpoint/2015/main" val="1"/>
+                <p16:designElem xmlns:p16="http://schemas.microsoft.com/office/powerpoint/2015/main" xmlns="" val="1"/>
               </p:ext>
             </p:extLst>
           </p:nvPr>
@@ -29924,7 +29903,7 @@
           <p:cNvPr id="2" name="Title 1">
             <a:extLst>
               <a:ext uri="{FF2B5EF4-FFF2-40B4-BE49-F238E27FC236}">
-                <a16:creationId xmlns="" xmlns:a16="http://schemas.microsoft.com/office/drawing/2014/main" id="{A5F6196D-B07E-499E-92C0-6953CE9F25D4}"/>
+                <a16:creationId xmlns:a16="http://schemas.microsoft.com/office/drawing/2014/main" xmlns="" id="{A5F6196D-B07E-499E-92C0-6953CE9F25D4}"/>
               </a:ext>
             </a:extLst>
           </p:cNvPr>
@@ -29949,11 +29928,7 @@
           <a:p>
             <a:r>
               <a:rPr lang="en-US" b="1" dirty="0" smtClean="0"/>
-              <a:t>Counting</a:t>
-            </a:r>
-            <a:r>
-              <a:rPr lang="en-US" b="1" dirty="0" smtClean="0"/>
-              <a:t>… (Signed)</a:t>
+              <a:t>Counting… (Signed)</a:t>
             </a:r>
             <a:endParaRPr lang="en-US" b="1" dirty="0"/>
           </a:p>
@@ -30313,7 +30288,7 @@
           <p:cNvPr id="15" name="Content Placeholder 16">
             <a:extLst>
               <a:ext uri="{FF2B5EF4-FFF2-40B4-BE49-F238E27FC236}">
-                <a16:creationId xmlns="" xmlns:a16="http://schemas.microsoft.com/office/drawing/2014/main" id="{5FDBA27F-9676-4EE6-B75A-C35B42A0CD81}"/>
+                <a16:creationId xmlns:a16="http://schemas.microsoft.com/office/drawing/2014/main" xmlns="" id="{5FDBA27F-9676-4EE6-B75A-C35B42A0CD81}"/>
               </a:ext>
             </a:extLst>
           </p:cNvPr>
@@ -30509,7 +30484,7 @@
           <p:cNvPr id="18" name="Content Placeholder 16">
             <a:extLst>
               <a:ext uri="{FF2B5EF4-FFF2-40B4-BE49-F238E27FC236}">
-                <a16:creationId xmlns="" xmlns:a16="http://schemas.microsoft.com/office/drawing/2014/main" id="{5FDBA27F-9676-4EE6-B75A-C35B42A0CD81}"/>
+                <a16:creationId xmlns:a16="http://schemas.microsoft.com/office/drawing/2014/main" xmlns="" id="{5FDBA27F-9676-4EE6-B75A-C35B42A0CD81}"/>
               </a:ext>
             </a:extLst>
           </p:cNvPr>

</xml_diff>